<commit_message>
P3_Cleaning - ajouté nettoyage countries - éliminé les catégories en sous-effectif | P3_Analysis - missing val, histogrammes, boxplots, corr heatmap, pairplot, démarré la PCA
</commit_message>
<xml_diff>
--- a/SOUTENANCE/Projet3.pptx
+++ b/SOUTENANCE/Projet3.pptx
@@ -6,6 +6,7 @@
   </p:sldMasterIdLst>
   <p:sldIdLst>
     <p:sldId id="256" r:id="rId2"/>
+    <p:sldId id="257" r:id="rId3"/>
   </p:sldIdLst>
   <p:sldSz cx="9144000" cy="6858000" type="screen4x3"/>
   <p:notesSz cx="6858000" cy="9144000"/>
@@ -288,7 +289,7 @@
           <a:p>
             <a:fld id="{63B6431C-D98E-4054-AC85-4318E682A8C6}" type="datetimeFigureOut">
               <a:rPr lang="fr-FR" smtClean="0"/>
-              <a:t>18/05/2020</a:t>
+              <a:t>21/05/2020</a:t>
             </a:fld>
             <a:endParaRPr lang="fr-FR"/>
           </a:p>
@@ -458,7 +459,7 @@
           <a:p>
             <a:fld id="{63B6431C-D98E-4054-AC85-4318E682A8C6}" type="datetimeFigureOut">
               <a:rPr lang="fr-FR" smtClean="0"/>
-              <a:t>18/05/2020</a:t>
+              <a:t>21/05/2020</a:t>
             </a:fld>
             <a:endParaRPr lang="fr-FR"/>
           </a:p>
@@ -638,7 +639,7 @@
           <a:p>
             <a:fld id="{63B6431C-D98E-4054-AC85-4318E682A8C6}" type="datetimeFigureOut">
               <a:rPr lang="fr-FR" smtClean="0"/>
-              <a:t>18/05/2020</a:t>
+              <a:t>21/05/2020</a:t>
             </a:fld>
             <a:endParaRPr lang="fr-FR"/>
           </a:p>
@@ -808,7 +809,7 @@
           <a:p>
             <a:fld id="{63B6431C-D98E-4054-AC85-4318E682A8C6}" type="datetimeFigureOut">
               <a:rPr lang="fr-FR" smtClean="0"/>
-              <a:t>18/05/2020</a:t>
+              <a:t>21/05/2020</a:t>
             </a:fld>
             <a:endParaRPr lang="fr-FR"/>
           </a:p>
@@ -1054,7 +1055,7 @@
           <a:p>
             <a:fld id="{63B6431C-D98E-4054-AC85-4318E682A8C6}" type="datetimeFigureOut">
               <a:rPr lang="fr-FR" smtClean="0"/>
-              <a:t>18/05/2020</a:t>
+              <a:t>21/05/2020</a:t>
             </a:fld>
             <a:endParaRPr lang="fr-FR"/>
           </a:p>
@@ -1342,7 +1343,7 @@
           <a:p>
             <a:fld id="{63B6431C-D98E-4054-AC85-4318E682A8C6}" type="datetimeFigureOut">
               <a:rPr lang="fr-FR" smtClean="0"/>
-              <a:t>18/05/2020</a:t>
+              <a:t>21/05/2020</a:t>
             </a:fld>
             <a:endParaRPr lang="fr-FR"/>
           </a:p>
@@ -1764,7 +1765,7 @@
           <a:p>
             <a:fld id="{63B6431C-D98E-4054-AC85-4318E682A8C6}" type="datetimeFigureOut">
               <a:rPr lang="fr-FR" smtClean="0"/>
-              <a:t>18/05/2020</a:t>
+              <a:t>21/05/2020</a:t>
             </a:fld>
             <a:endParaRPr lang="fr-FR"/>
           </a:p>
@@ -1882,7 +1883,7 @@
           <a:p>
             <a:fld id="{63B6431C-D98E-4054-AC85-4318E682A8C6}" type="datetimeFigureOut">
               <a:rPr lang="fr-FR" smtClean="0"/>
-              <a:t>18/05/2020</a:t>
+              <a:t>21/05/2020</a:t>
             </a:fld>
             <a:endParaRPr lang="fr-FR"/>
           </a:p>
@@ -1977,7 +1978,7 @@
           <a:p>
             <a:fld id="{63B6431C-D98E-4054-AC85-4318E682A8C6}" type="datetimeFigureOut">
               <a:rPr lang="fr-FR" smtClean="0"/>
-              <a:t>18/05/2020</a:t>
+              <a:t>21/05/2020</a:t>
             </a:fld>
             <a:endParaRPr lang="fr-FR"/>
           </a:p>
@@ -2254,7 +2255,7 @@
           <a:p>
             <a:fld id="{63B6431C-D98E-4054-AC85-4318E682A8C6}" type="datetimeFigureOut">
               <a:rPr lang="fr-FR" smtClean="0"/>
-              <a:t>18/05/2020</a:t>
+              <a:t>21/05/2020</a:t>
             </a:fld>
             <a:endParaRPr lang="fr-FR"/>
           </a:p>
@@ -2507,7 +2508,7 @@
           <a:p>
             <a:fld id="{63B6431C-D98E-4054-AC85-4318E682A8C6}" type="datetimeFigureOut">
               <a:rPr lang="fr-FR" smtClean="0"/>
-              <a:t>18/05/2020</a:t>
+              <a:t>21/05/2020</a:t>
             </a:fld>
             <a:endParaRPr lang="fr-FR"/>
           </a:p>
@@ -2720,7 +2721,7 @@
           <a:p>
             <a:fld id="{63B6431C-D98E-4054-AC85-4318E682A8C6}" type="datetimeFigureOut">
               <a:rPr lang="fr-FR" smtClean="0"/>
-              <a:t>18/05/2020</a:t>
+              <a:t>21/05/2020</a:t>
             </a:fld>
             <a:endParaRPr lang="fr-FR"/>
           </a:p>
@@ -3186,6 +3187,731 @@
     <p:extLst>
       <p:ext uri="{BB962C8B-B14F-4D97-AF65-F5344CB8AC3E}">
         <p14:creationId xmlns:p14="http://schemas.microsoft.com/office/powerpoint/2010/main" val="1370742491"/>
+      </p:ext>
+    </p:extLst>
+  </p:cSld>
+  <p:clrMapOvr>
+    <a:masterClrMapping/>
+  </p:clrMapOvr>
+</p:sld>
+</file>
+
+<file path=ppt/slides/slide2.xml><?xml version="1.0" encoding="utf-8"?>
+<p:sld xmlns:a="http://schemas.openxmlformats.org/drawingml/2006/main" xmlns:r="http://schemas.openxmlformats.org/officeDocument/2006/relationships" xmlns:p="http://schemas.openxmlformats.org/presentationml/2006/main">
+  <p:cSld>
+    <p:spTree>
+      <p:nvGrpSpPr>
+        <p:cNvPr id="1" name=""/>
+        <p:cNvGrpSpPr/>
+        <p:nvPr/>
+      </p:nvGrpSpPr>
+      <p:grpSpPr>
+        <a:xfrm>
+          <a:off x="0" y="0"/>
+          <a:ext cx="0" cy="0"/>
+          <a:chOff x="0" y="0"/>
+          <a:chExt cx="0" cy="0"/>
+        </a:xfrm>
+      </p:grpSpPr>
+      <p:sp>
+        <p:nvSpPr>
+          <p:cNvPr id="2" name="Titre 1"/>
+          <p:cNvSpPr>
+            <a:spLocks noGrp="1"/>
+          </p:cNvSpPr>
+          <p:nvPr>
+            <p:ph type="title"/>
+          </p:nvPr>
+        </p:nvSpPr>
+        <p:spPr/>
+        <p:txBody>
+          <a:bodyPr/>
+          <a:lstStyle/>
+          <a:p>
+            <a:r>
+              <a:rPr lang="fr-FR" dirty="0" err="1" smtClean="0"/>
+              <a:t>Cleaning</a:t>
+            </a:r>
+            <a:endParaRPr lang="fr-FR" dirty="0"/>
+          </a:p>
+        </p:txBody>
+      </p:sp>
+      <p:graphicFrame>
+        <p:nvGraphicFramePr>
+          <p:cNvPr id="3" name="Tableau 2"/>
+          <p:cNvGraphicFramePr>
+            <a:graphicFrameLocks noGrp="1"/>
+          </p:cNvGraphicFramePr>
+          <p:nvPr>
+            <p:extLst>
+              <p:ext uri="{D42A27DB-BD31-4B8C-83A1-F6EECF244321}">
+                <p14:modId xmlns:p14="http://schemas.microsoft.com/office/powerpoint/2010/main" val="2359018309"/>
+              </p:ext>
+            </p:extLst>
+          </p:nvPr>
+        </p:nvGraphicFramePr>
+        <p:xfrm>
+          <a:off x="467544" y="1412776"/>
+          <a:ext cx="8280920" cy="4300008"/>
+        </p:xfrm>
+        <a:graphic>
+          <a:graphicData uri="http://schemas.openxmlformats.org/drawingml/2006/table">
+            <a:tbl>
+              <a:tblPr firstRow="1" bandRow="1">
+                <a:tableStyleId>{5940675A-B579-460E-94D1-54222C63F5DA}</a:tableStyleId>
+              </a:tblPr>
+              <a:tblGrid>
+                <a:gridCol w="1035115"/>
+                <a:gridCol w="1035115"/>
+                <a:gridCol w="1035115"/>
+                <a:gridCol w="1035115"/>
+                <a:gridCol w="1044116"/>
+                <a:gridCol w="1026114"/>
+                <a:gridCol w="1035115"/>
+                <a:gridCol w="1035115"/>
+              </a:tblGrid>
+              <a:tr h="792088">
+                <a:tc>
+                  <a:txBody>
+                    <a:bodyPr/>
+                    <a:lstStyle/>
+                    <a:p>
+                      <a:endParaRPr lang="fr-FR" dirty="0"/>
+                    </a:p>
+                  </a:txBody>
+                  <a:tcPr/>
+                </a:tc>
+                <a:tc>
+                  <a:txBody>
+                    <a:bodyPr/>
+                    <a:lstStyle/>
+                    <a:p>
+                      <a:endParaRPr lang="fr-FR" dirty="0"/>
+                    </a:p>
+                  </a:txBody>
+                  <a:tcPr/>
+                </a:tc>
+                <a:tc>
+                  <a:txBody>
+                    <a:bodyPr/>
+                    <a:lstStyle/>
+                    <a:p>
+                      <a:r>
+                        <a:rPr lang="fr-FR" dirty="0" smtClean="0"/>
+                        <a:t>Type</a:t>
+                      </a:r>
+                      <a:endParaRPr lang="fr-FR" dirty="0"/>
+                    </a:p>
+                  </a:txBody>
+                  <a:tcPr/>
+                </a:tc>
+                <a:tc>
+                  <a:txBody>
+                    <a:bodyPr/>
+                    <a:lstStyle/>
+                    <a:p>
+                      <a:r>
+                        <a:rPr lang="fr-FR" dirty="0" smtClean="0"/>
+                        <a:t>Nb</a:t>
+                      </a:r>
+                      <a:r>
+                        <a:rPr lang="fr-FR" baseline="0" dirty="0" smtClean="0"/>
+                        <a:t> </a:t>
+                      </a:r>
+                      <a:r>
+                        <a:rPr lang="fr-FR" dirty="0" err="1" smtClean="0"/>
+                        <a:t>deleted</a:t>
+                      </a:r>
+                      <a:endParaRPr lang="fr-FR" dirty="0"/>
+                    </a:p>
+                  </a:txBody>
+                  <a:tcPr/>
+                </a:tc>
+                <a:tc>
+                  <a:txBody>
+                    <a:bodyPr/>
+                    <a:lstStyle/>
+                    <a:p>
+                      <a:r>
+                        <a:rPr lang="fr-FR" dirty="0" smtClean="0"/>
+                        <a:t>Nb </a:t>
+                      </a:r>
+                      <a:r>
+                        <a:rPr lang="fr-FR" dirty="0" err="1" smtClean="0"/>
+                        <a:t>fixed</a:t>
+                      </a:r>
+                      <a:endParaRPr lang="fr-FR" dirty="0"/>
+                    </a:p>
+                  </a:txBody>
+                  <a:tcPr/>
+                </a:tc>
+                <a:tc>
+                  <a:txBody>
+                    <a:bodyPr/>
+                    <a:lstStyle/>
+                    <a:p>
+                      <a:endParaRPr lang="fr-FR"/>
+                    </a:p>
+                  </a:txBody>
+                  <a:tcPr/>
+                </a:tc>
+                <a:tc>
+                  <a:txBody>
+                    <a:bodyPr/>
+                    <a:lstStyle/>
+                    <a:p>
+                      <a:r>
+                        <a:rPr lang="fr-FR" dirty="0" smtClean="0"/>
+                        <a:t>Nb col</a:t>
+                      </a:r>
+                      <a:endParaRPr lang="fr-FR" dirty="0"/>
+                    </a:p>
+                  </a:txBody>
+                  <a:tcPr/>
+                </a:tc>
+                <a:tc>
+                  <a:txBody>
+                    <a:bodyPr/>
+                    <a:lstStyle/>
+                    <a:p>
+                      <a:r>
+                        <a:rPr lang="fr-FR" dirty="0" err="1" smtClean="0"/>
+                        <a:t>nbcol</a:t>
+                      </a:r>
+                      <a:endParaRPr lang="fr-FR" dirty="0"/>
+                    </a:p>
+                  </a:txBody>
+                  <a:tcPr/>
+                </a:tc>
+              </a:tr>
+              <a:tr h="576064">
+                <a:tc>
+                  <a:txBody>
+                    <a:bodyPr/>
+                    <a:lstStyle/>
+                    <a:p>
+                      <a:r>
+                        <a:rPr lang="fr-FR" dirty="0" smtClean="0"/>
+                        <a:t>0</a:t>
+                      </a:r>
+                      <a:endParaRPr lang="fr-FR" dirty="0"/>
+                    </a:p>
+                  </a:txBody>
+                  <a:tcPr/>
+                </a:tc>
+                <a:tc>
+                  <a:txBody>
+                    <a:bodyPr/>
+                    <a:lstStyle/>
+                    <a:p>
+                      <a:endParaRPr lang="fr-FR" dirty="0"/>
+                    </a:p>
+                  </a:txBody>
+                  <a:tcPr/>
+                </a:tc>
+                <a:tc>
+                  <a:txBody>
+                    <a:bodyPr/>
+                    <a:lstStyle/>
+                    <a:p>
+                      <a:endParaRPr lang="fr-FR" dirty="0"/>
+                    </a:p>
+                  </a:txBody>
+                  <a:tcPr/>
+                </a:tc>
+                <a:tc>
+                  <a:txBody>
+                    <a:bodyPr/>
+                    <a:lstStyle/>
+                    <a:p>
+                      <a:endParaRPr lang="fr-FR" dirty="0"/>
+                    </a:p>
+                  </a:txBody>
+                  <a:tcPr/>
+                </a:tc>
+                <a:tc>
+                  <a:txBody>
+                    <a:bodyPr/>
+                    <a:lstStyle/>
+                    <a:p>
+                      <a:endParaRPr lang="fr-FR" dirty="0"/>
+                    </a:p>
+                  </a:txBody>
+                  <a:tcPr/>
+                </a:tc>
+                <a:tc>
+                  <a:txBody>
+                    <a:bodyPr/>
+                    <a:lstStyle/>
+                    <a:p>
+                      <a:endParaRPr lang="fr-FR" dirty="0"/>
+                    </a:p>
+                  </a:txBody>
+                  <a:tcPr/>
+                </a:tc>
+                <a:tc>
+                  <a:txBody>
+                    <a:bodyPr/>
+                    <a:lstStyle/>
+                    <a:p>
+                      <a:endParaRPr lang="fr-FR" dirty="0"/>
+                    </a:p>
+                  </a:txBody>
+                  <a:tcPr/>
+                </a:tc>
+                <a:tc>
+                  <a:txBody>
+                    <a:bodyPr/>
+                    <a:lstStyle/>
+                    <a:p>
+                      <a:endParaRPr lang="fr-FR" dirty="0"/>
+                    </a:p>
+                  </a:txBody>
+                  <a:tcPr/>
+                </a:tc>
+              </a:tr>
+              <a:tr h="576064">
+                <a:tc>
+                  <a:txBody>
+                    <a:bodyPr/>
+                    <a:lstStyle/>
+                    <a:p>
+                      <a:r>
+                        <a:rPr lang="fr-FR" dirty="0" smtClean="0"/>
+                        <a:t>1</a:t>
+                      </a:r>
+                      <a:endParaRPr lang="fr-FR" dirty="0"/>
+                    </a:p>
+                  </a:txBody>
+                  <a:tcPr/>
+                </a:tc>
+                <a:tc>
+                  <a:txBody>
+                    <a:bodyPr/>
+                    <a:lstStyle/>
+                    <a:p>
+                      <a:endParaRPr lang="fr-FR" dirty="0"/>
+                    </a:p>
+                  </a:txBody>
+                  <a:tcPr/>
+                </a:tc>
+                <a:tc>
+                  <a:txBody>
+                    <a:bodyPr/>
+                    <a:lstStyle/>
+                    <a:p>
+                      <a:r>
+                        <a:rPr lang="fr-FR" dirty="0" err="1" smtClean="0"/>
+                        <a:t>columns</a:t>
+                      </a:r>
+                      <a:endParaRPr lang="fr-FR" dirty="0"/>
+                    </a:p>
+                  </a:txBody>
+                  <a:tcPr/>
+                </a:tc>
+                <a:tc>
+                  <a:txBody>
+                    <a:bodyPr/>
+                    <a:lstStyle/>
+                    <a:p>
+                      <a:endParaRPr lang="fr-FR" dirty="0"/>
+                    </a:p>
+                  </a:txBody>
+                  <a:tcPr/>
+                </a:tc>
+                <a:tc>
+                  <a:txBody>
+                    <a:bodyPr/>
+                    <a:lstStyle/>
+                    <a:p>
+                      <a:endParaRPr lang="fr-FR" dirty="0"/>
+                    </a:p>
+                  </a:txBody>
+                  <a:tcPr/>
+                </a:tc>
+                <a:tc>
+                  <a:txBody>
+                    <a:bodyPr/>
+                    <a:lstStyle/>
+                    <a:p>
+                      <a:endParaRPr lang="fr-FR" dirty="0"/>
+                    </a:p>
+                  </a:txBody>
+                  <a:tcPr/>
+                </a:tc>
+                <a:tc>
+                  <a:txBody>
+                    <a:bodyPr/>
+                    <a:lstStyle/>
+                    <a:p>
+                      <a:endParaRPr lang="fr-FR" dirty="0"/>
+                    </a:p>
+                  </a:txBody>
+                  <a:tcPr/>
+                </a:tc>
+                <a:tc>
+                  <a:txBody>
+                    <a:bodyPr/>
+                    <a:lstStyle/>
+                    <a:p>
+                      <a:endParaRPr lang="fr-FR" dirty="0"/>
+                    </a:p>
+                  </a:txBody>
+                  <a:tcPr/>
+                </a:tc>
+              </a:tr>
+              <a:tr h="588948">
+                <a:tc>
+                  <a:txBody>
+                    <a:bodyPr/>
+                    <a:lstStyle/>
+                    <a:p>
+                      <a:r>
+                        <a:rPr lang="fr-FR" dirty="0" smtClean="0"/>
+                        <a:t>2</a:t>
+                      </a:r>
+                      <a:endParaRPr lang="fr-FR" dirty="0"/>
+                    </a:p>
+                  </a:txBody>
+                  <a:tcPr/>
+                </a:tc>
+                <a:tc>
+                  <a:txBody>
+                    <a:bodyPr/>
+                    <a:lstStyle/>
+                    <a:p>
+                      <a:endParaRPr lang="fr-FR" dirty="0"/>
+                    </a:p>
+                  </a:txBody>
+                  <a:tcPr/>
+                </a:tc>
+                <a:tc>
+                  <a:txBody>
+                    <a:bodyPr/>
+                    <a:lstStyle/>
+                    <a:p>
+                      <a:endParaRPr lang="fr-FR" dirty="0"/>
+                    </a:p>
+                  </a:txBody>
+                  <a:tcPr/>
+                </a:tc>
+                <a:tc>
+                  <a:txBody>
+                    <a:bodyPr/>
+                    <a:lstStyle/>
+                    <a:p>
+                      <a:endParaRPr lang="fr-FR"/>
+                    </a:p>
+                  </a:txBody>
+                  <a:tcPr/>
+                </a:tc>
+                <a:tc>
+                  <a:txBody>
+                    <a:bodyPr/>
+                    <a:lstStyle/>
+                    <a:p>
+                      <a:endParaRPr lang="fr-FR"/>
+                    </a:p>
+                  </a:txBody>
+                  <a:tcPr/>
+                </a:tc>
+                <a:tc>
+                  <a:txBody>
+                    <a:bodyPr/>
+                    <a:lstStyle/>
+                    <a:p>
+                      <a:endParaRPr lang="fr-FR"/>
+                    </a:p>
+                  </a:txBody>
+                  <a:tcPr/>
+                </a:tc>
+                <a:tc>
+                  <a:txBody>
+                    <a:bodyPr/>
+                    <a:lstStyle/>
+                    <a:p>
+                      <a:endParaRPr lang="fr-FR"/>
+                    </a:p>
+                  </a:txBody>
+                  <a:tcPr/>
+                </a:tc>
+                <a:tc>
+                  <a:txBody>
+                    <a:bodyPr/>
+                    <a:lstStyle/>
+                    <a:p>
+                      <a:endParaRPr lang="fr-FR"/>
+                    </a:p>
+                  </a:txBody>
+                  <a:tcPr/>
+                </a:tc>
+              </a:tr>
+              <a:tr h="588948">
+                <a:tc>
+                  <a:txBody>
+                    <a:bodyPr/>
+                    <a:lstStyle/>
+                    <a:p>
+                      <a:r>
+                        <a:rPr lang="fr-FR" dirty="0" smtClean="0"/>
+                        <a:t>3</a:t>
+                      </a:r>
+                      <a:endParaRPr lang="fr-FR" dirty="0"/>
+                    </a:p>
+                  </a:txBody>
+                  <a:tcPr/>
+                </a:tc>
+                <a:tc>
+                  <a:txBody>
+                    <a:bodyPr/>
+                    <a:lstStyle/>
+                    <a:p>
+                      <a:endParaRPr lang="fr-FR"/>
+                    </a:p>
+                  </a:txBody>
+                  <a:tcPr/>
+                </a:tc>
+                <a:tc>
+                  <a:txBody>
+                    <a:bodyPr/>
+                    <a:lstStyle/>
+                    <a:p>
+                      <a:endParaRPr lang="fr-FR"/>
+                    </a:p>
+                  </a:txBody>
+                  <a:tcPr/>
+                </a:tc>
+                <a:tc>
+                  <a:txBody>
+                    <a:bodyPr/>
+                    <a:lstStyle/>
+                    <a:p>
+                      <a:endParaRPr lang="fr-FR"/>
+                    </a:p>
+                  </a:txBody>
+                  <a:tcPr/>
+                </a:tc>
+                <a:tc>
+                  <a:txBody>
+                    <a:bodyPr/>
+                    <a:lstStyle/>
+                    <a:p>
+                      <a:endParaRPr lang="fr-FR"/>
+                    </a:p>
+                  </a:txBody>
+                  <a:tcPr/>
+                </a:tc>
+                <a:tc>
+                  <a:txBody>
+                    <a:bodyPr/>
+                    <a:lstStyle/>
+                    <a:p>
+                      <a:endParaRPr lang="fr-FR"/>
+                    </a:p>
+                  </a:txBody>
+                  <a:tcPr/>
+                </a:tc>
+                <a:tc>
+                  <a:txBody>
+                    <a:bodyPr/>
+                    <a:lstStyle/>
+                    <a:p>
+                      <a:endParaRPr lang="fr-FR"/>
+                    </a:p>
+                  </a:txBody>
+                  <a:tcPr/>
+                </a:tc>
+                <a:tc>
+                  <a:txBody>
+                    <a:bodyPr/>
+                    <a:lstStyle/>
+                    <a:p>
+                      <a:endParaRPr lang="fr-FR"/>
+                    </a:p>
+                  </a:txBody>
+                  <a:tcPr/>
+                </a:tc>
+              </a:tr>
+              <a:tr h="588948">
+                <a:tc>
+                  <a:txBody>
+                    <a:bodyPr/>
+                    <a:lstStyle/>
+                    <a:p>
+                      <a:r>
+                        <a:rPr lang="fr-FR" dirty="0" smtClean="0"/>
+                        <a:t>4</a:t>
+                      </a:r>
+                      <a:endParaRPr lang="fr-FR" dirty="0"/>
+                    </a:p>
+                  </a:txBody>
+                  <a:tcPr/>
+                </a:tc>
+                <a:tc>
+                  <a:txBody>
+                    <a:bodyPr/>
+                    <a:lstStyle/>
+                    <a:p>
+                      <a:endParaRPr lang="fr-FR"/>
+                    </a:p>
+                  </a:txBody>
+                  <a:tcPr/>
+                </a:tc>
+                <a:tc>
+                  <a:txBody>
+                    <a:bodyPr/>
+                    <a:lstStyle/>
+                    <a:p>
+                      <a:endParaRPr lang="fr-FR"/>
+                    </a:p>
+                  </a:txBody>
+                  <a:tcPr/>
+                </a:tc>
+                <a:tc>
+                  <a:txBody>
+                    <a:bodyPr/>
+                    <a:lstStyle/>
+                    <a:p>
+                      <a:endParaRPr lang="fr-FR"/>
+                    </a:p>
+                  </a:txBody>
+                  <a:tcPr/>
+                </a:tc>
+                <a:tc>
+                  <a:txBody>
+                    <a:bodyPr/>
+                    <a:lstStyle/>
+                    <a:p>
+                      <a:endParaRPr lang="fr-FR"/>
+                    </a:p>
+                  </a:txBody>
+                  <a:tcPr/>
+                </a:tc>
+                <a:tc>
+                  <a:txBody>
+                    <a:bodyPr/>
+                    <a:lstStyle/>
+                    <a:p>
+                      <a:endParaRPr lang="fr-FR"/>
+                    </a:p>
+                  </a:txBody>
+                  <a:tcPr/>
+                </a:tc>
+                <a:tc>
+                  <a:txBody>
+                    <a:bodyPr/>
+                    <a:lstStyle/>
+                    <a:p>
+                      <a:endParaRPr lang="fr-FR"/>
+                    </a:p>
+                  </a:txBody>
+                  <a:tcPr/>
+                </a:tc>
+                <a:tc>
+                  <a:txBody>
+                    <a:bodyPr/>
+                    <a:lstStyle/>
+                    <a:p>
+                      <a:endParaRPr lang="fr-FR"/>
+                    </a:p>
+                  </a:txBody>
+                  <a:tcPr/>
+                </a:tc>
+              </a:tr>
+              <a:tr h="588948">
+                <a:tc>
+                  <a:txBody>
+                    <a:bodyPr/>
+                    <a:lstStyle/>
+                    <a:p>
+                      <a:r>
+                        <a:rPr lang="fr-FR" dirty="0" smtClean="0"/>
+                        <a:t>5</a:t>
+                      </a:r>
+                      <a:endParaRPr lang="fr-FR" dirty="0"/>
+                    </a:p>
+                  </a:txBody>
+                  <a:tcPr/>
+                </a:tc>
+                <a:tc>
+                  <a:txBody>
+                    <a:bodyPr/>
+                    <a:lstStyle/>
+                    <a:p>
+                      <a:endParaRPr lang="fr-FR" dirty="0"/>
+                    </a:p>
+                  </a:txBody>
+                  <a:tcPr/>
+                </a:tc>
+                <a:tc>
+                  <a:txBody>
+                    <a:bodyPr/>
+                    <a:lstStyle/>
+                    <a:p>
+                      <a:endParaRPr lang="fr-FR"/>
+                    </a:p>
+                  </a:txBody>
+                  <a:tcPr/>
+                </a:tc>
+                <a:tc>
+                  <a:txBody>
+                    <a:bodyPr/>
+                    <a:lstStyle/>
+                    <a:p>
+                      <a:endParaRPr lang="fr-FR"/>
+                    </a:p>
+                  </a:txBody>
+                  <a:tcPr/>
+                </a:tc>
+                <a:tc>
+                  <a:txBody>
+                    <a:bodyPr/>
+                    <a:lstStyle/>
+                    <a:p>
+                      <a:endParaRPr lang="fr-FR"/>
+                    </a:p>
+                  </a:txBody>
+                  <a:tcPr/>
+                </a:tc>
+                <a:tc>
+                  <a:txBody>
+                    <a:bodyPr/>
+                    <a:lstStyle/>
+                    <a:p>
+                      <a:endParaRPr lang="fr-FR"/>
+                    </a:p>
+                  </a:txBody>
+                  <a:tcPr/>
+                </a:tc>
+                <a:tc>
+                  <a:txBody>
+                    <a:bodyPr/>
+                    <a:lstStyle/>
+                    <a:p>
+                      <a:endParaRPr lang="fr-FR"/>
+                    </a:p>
+                  </a:txBody>
+                  <a:tcPr/>
+                </a:tc>
+                <a:tc>
+                  <a:txBody>
+                    <a:bodyPr/>
+                    <a:lstStyle/>
+                    <a:p>
+                      <a:endParaRPr lang="fr-FR" dirty="0"/>
+                    </a:p>
+                  </a:txBody>
+                  <a:tcPr/>
+                </a:tc>
+              </a:tr>
+            </a:tbl>
+          </a:graphicData>
+        </a:graphic>
+      </p:graphicFrame>
+    </p:spTree>
+    <p:extLst>
+      <p:ext uri="{BB962C8B-B14F-4D97-AF65-F5344CB8AC3E}">
+        <p14:creationId xmlns:p14="http://schemas.microsoft.com/office/powerpoint/2010/main" val="215950786"/>
       </p:ext>
     </p:extLst>
   </p:cSld>

</xml_diff>

<commit_message>
P3_Cleaning : changé colonnes countries - éliminé tirets - datetime | P3_Analysis : categorical count plots, new item through time, ppscore
</commit_message>
<xml_diff>
--- a/SOUTENANCE/Projet3.pptx
+++ b/SOUTENANCE/Projet3.pptx
@@ -6,7 +6,8 @@
   </p:sldMasterIdLst>
   <p:sldIdLst>
     <p:sldId id="256" r:id="rId2"/>
-    <p:sldId id="257" r:id="rId3"/>
+    <p:sldId id="258" r:id="rId3"/>
+    <p:sldId id="257" r:id="rId4"/>
   </p:sldIdLst>
   <p:sldSz cx="9144000" cy="6858000" type="screen4x3"/>
   <p:notesSz cx="6858000" cy="9144000"/>
@@ -289,7 +290,7 @@
           <a:p>
             <a:fld id="{63B6431C-D98E-4054-AC85-4318E682A8C6}" type="datetimeFigureOut">
               <a:rPr lang="fr-FR" smtClean="0"/>
-              <a:t>21/05/2020</a:t>
+              <a:t>01/06/2020</a:t>
             </a:fld>
             <a:endParaRPr lang="fr-FR"/>
           </a:p>
@@ -459,7 +460,7 @@
           <a:p>
             <a:fld id="{63B6431C-D98E-4054-AC85-4318E682A8C6}" type="datetimeFigureOut">
               <a:rPr lang="fr-FR" smtClean="0"/>
-              <a:t>21/05/2020</a:t>
+              <a:t>01/06/2020</a:t>
             </a:fld>
             <a:endParaRPr lang="fr-FR"/>
           </a:p>
@@ -639,7 +640,7 @@
           <a:p>
             <a:fld id="{63B6431C-D98E-4054-AC85-4318E682A8C6}" type="datetimeFigureOut">
               <a:rPr lang="fr-FR" smtClean="0"/>
-              <a:t>21/05/2020</a:t>
+              <a:t>01/06/2020</a:t>
             </a:fld>
             <a:endParaRPr lang="fr-FR"/>
           </a:p>
@@ -809,7 +810,7 @@
           <a:p>
             <a:fld id="{63B6431C-D98E-4054-AC85-4318E682A8C6}" type="datetimeFigureOut">
               <a:rPr lang="fr-FR" smtClean="0"/>
-              <a:t>21/05/2020</a:t>
+              <a:t>01/06/2020</a:t>
             </a:fld>
             <a:endParaRPr lang="fr-FR"/>
           </a:p>
@@ -1055,7 +1056,7 @@
           <a:p>
             <a:fld id="{63B6431C-D98E-4054-AC85-4318E682A8C6}" type="datetimeFigureOut">
               <a:rPr lang="fr-FR" smtClean="0"/>
-              <a:t>21/05/2020</a:t>
+              <a:t>01/06/2020</a:t>
             </a:fld>
             <a:endParaRPr lang="fr-FR"/>
           </a:p>
@@ -1343,7 +1344,7 @@
           <a:p>
             <a:fld id="{63B6431C-D98E-4054-AC85-4318E682A8C6}" type="datetimeFigureOut">
               <a:rPr lang="fr-FR" smtClean="0"/>
-              <a:t>21/05/2020</a:t>
+              <a:t>01/06/2020</a:t>
             </a:fld>
             <a:endParaRPr lang="fr-FR"/>
           </a:p>
@@ -1765,7 +1766,7 @@
           <a:p>
             <a:fld id="{63B6431C-D98E-4054-AC85-4318E682A8C6}" type="datetimeFigureOut">
               <a:rPr lang="fr-FR" smtClean="0"/>
-              <a:t>21/05/2020</a:t>
+              <a:t>01/06/2020</a:t>
             </a:fld>
             <a:endParaRPr lang="fr-FR"/>
           </a:p>
@@ -1883,7 +1884,7 @@
           <a:p>
             <a:fld id="{63B6431C-D98E-4054-AC85-4318E682A8C6}" type="datetimeFigureOut">
               <a:rPr lang="fr-FR" smtClean="0"/>
-              <a:t>21/05/2020</a:t>
+              <a:t>01/06/2020</a:t>
             </a:fld>
             <a:endParaRPr lang="fr-FR"/>
           </a:p>
@@ -1978,7 +1979,7 @@
           <a:p>
             <a:fld id="{63B6431C-D98E-4054-AC85-4318E682A8C6}" type="datetimeFigureOut">
               <a:rPr lang="fr-FR" smtClean="0"/>
-              <a:t>21/05/2020</a:t>
+              <a:t>01/06/2020</a:t>
             </a:fld>
             <a:endParaRPr lang="fr-FR"/>
           </a:p>
@@ -2255,7 +2256,7 @@
           <a:p>
             <a:fld id="{63B6431C-D98E-4054-AC85-4318E682A8C6}" type="datetimeFigureOut">
               <a:rPr lang="fr-FR" smtClean="0"/>
-              <a:t>21/05/2020</a:t>
+              <a:t>01/06/2020</a:t>
             </a:fld>
             <a:endParaRPr lang="fr-FR"/>
           </a:p>
@@ -2508,7 +2509,7 @@
           <a:p>
             <a:fld id="{63B6431C-D98E-4054-AC85-4318E682A8C6}" type="datetimeFigureOut">
               <a:rPr lang="fr-FR" smtClean="0"/>
-              <a:t>21/05/2020</a:t>
+              <a:t>01/06/2020</a:t>
             </a:fld>
             <a:endParaRPr lang="fr-FR"/>
           </a:p>
@@ -2721,7 +2722,7 @@
           <a:p>
             <a:fld id="{63B6431C-D98E-4054-AC85-4318E682A8C6}" type="datetimeFigureOut">
               <a:rPr lang="fr-FR" smtClean="0"/>
-              <a:t>21/05/2020</a:t>
+              <a:t>01/06/2020</a:t>
             </a:fld>
             <a:endParaRPr lang="fr-FR"/>
           </a:p>
@@ -3197,6 +3198,156 @@
 </file>
 
 <file path=ppt/slides/slide2.xml><?xml version="1.0" encoding="utf-8"?>
+<p:sld xmlns:a="http://schemas.openxmlformats.org/drawingml/2006/main" xmlns:r="http://schemas.openxmlformats.org/officeDocument/2006/relationships" xmlns:p="http://schemas.openxmlformats.org/presentationml/2006/main">
+  <p:cSld>
+    <p:spTree>
+      <p:nvGrpSpPr>
+        <p:cNvPr id="1" name=""/>
+        <p:cNvGrpSpPr/>
+        <p:nvPr/>
+      </p:nvGrpSpPr>
+      <p:grpSpPr>
+        <a:xfrm>
+          <a:off x="0" y="0"/>
+          <a:ext cx="0" cy="0"/>
+          <a:chOff x="0" y="0"/>
+          <a:chExt cx="0" cy="0"/>
+        </a:xfrm>
+      </p:grpSpPr>
+      <p:sp>
+        <p:nvSpPr>
+          <p:cNvPr id="2" name="Titre 1"/>
+          <p:cNvSpPr>
+            <a:spLocks noGrp="1"/>
+          </p:cNvSpPr>
+          <p:nvPr>
+            <p:ph type="title"/>
+          </p:nvPr>
+        </p:nvSpPr>
+        <p:spPr/>
+        <p:txBody>
+          <a:bodyPr>
+            <a:normAutofit fontScale="90000"/>
+          </a:bodyPr>
+          <a:lstStyle/>
+          <a:p>
+            <a:pPr algn="l"/>
+            <a:r>
+              <a:rPr lang="fr-FR" b="1" dirty="0" smtClean="0"/>
+              <a:t>Base de donnée </a:t>
+            </a:r>
+            <a:r>
+              <a:rPr lang="fr-FR" b="1" dirty="0" err="1" smtClean="0"/>
+              <a:t>OpenFoodFacts</a:t>
+            </a:r>
+            <a:r>
+              <a:rPr lang="fr-FR" dirty="0" smtClean="0"/>
+              <a:t/>
+            </a:r>
+            <a:br>
+              <a:rPr lang="fr-FR" dirty="0" smtClean="0"/>
+            </a:br>
+            <a:r>
+              <a:rPr lang="fr-FR" sz="3600" dirty="0" smtClean="0"/>
+              <a:t>Application innovante en lien avec l’alimentation</a:t>
+            </a:r>
+            <a:endParaRPr lang="fr-FR" sz="3600" dirty="0"/>
+          </a:p>
+        </p:txBody>
+      </p:sp>
+      <p:sp>
+        <p:nvSpPr>
+          <p:cNvPr id="3" name="ZoneTexte 2"/>
+          <p:cNvSpPr txBox="1"/>
+          <p:nvPr/>
+        </p:nvSpPr>
+        <p:spPr>
+          <a:xfrm>
+            <a:off x="467544" y="2132856"/>
+            <a:ext cx="8064896" cy="2862322"/>
+          </a:xfrm>
+          <a:prstGeom prst="rect">
+            <a:avLst/>
+          </a:prstGeom>
+          <a:noFill/>
+        </p:spPr>
+        <p:txBody>
+          <a:bodyPr wrap="square" rtlCol="0">
+            <a:spAutoFit/>
+          </a:bodyPr>
+          <a:lstStyle/>
+          <a:p>
+            <a:r>
+              <a:rPr lang="fr-FR" dirty="0" smtClean="0"/>
+              <a:t>Une application qui permet de donner à un utilisateur  des suggestions de produits similaires en améliorant ou changeant des paramètres de son choix (marque, pays, plus sains, plus énergétiques,  emballage, quantité, plus vitaminé…)</a:t>
+            </a:r>
+          </a:p>
+          <a:p>
+            <a:endParaRPr lang="fr-FR" dirty="0"/>
+          </a:p>
+          <a:p>
+            <a:r>
+              <a:rPr lang="fr-FR" dirty="0" smtClean="0"/>
+              <a:t>Fonctionnalités offertes :</a:t>
+            </a:r>
+          </a:p>
+          <a:p>
+            <a:pPr marL="285750" indent="-285750">
+              <a:buFontTx/>
+              <a:buChar char="-"/>
+            </a:pPr>
+            <a:r>
+              <a:rPr lang="fr-FR" dirty="0" smtClean="0"/>
+              <a:t>Affichage des articles sur une carte par similarité</a:t>
+            </a:r>
+          </a:p>
+          <a:p>
+            <a:pPr marL="285750" indent="-285750">
+              <a:buFontTx/>
+              <a:buChar char="-"/>
+            </a:pPr>
+            <a:r>
+              <a:rPr lang="fr-FR" dirty="0" smtClean="0"/>
+              <a:t>Note de l’article pour chaque variable parmi ceux qui sont similaires</a:t>
+            </a:r>
+          </a:p>
+          <a:p>
+            <a:pPr marL="285750" indent="-285750">
+              <a:buFontTx/>
+              <a:buChar char="-"/>
+            </a:pPr>
+            <a:endParaRPr lang="fr-FR" dirty="0"/>
+          </a:p>
+          <a:p>
+            <a:pPr marL="285750" indent="-285750">
+              <a:buFontTx/>
+              <a:buChar char="-"/>
+            </a:pPr>
+            <a:endParaRPr lang="fr-FR" dirty="0" smtClean="0"/>
+          </a:p>
+          <a:p>
+            <a:pPr marL="285750" indent="-285750">
+              <a:buFontTx/>
+              <a:buChar char="-"/>
+            </a:pPr>
+            <a:endParaRPr lang="fr-FR" dirty="0" smtClean="0"/>
+          </a:p>
+        </p:txBody>
+      </p:sp>
+    </p:spTree>
+    <p:extLst>
+      <p:ext uri="{BB962C8B-B14F-4D97-AF65-F5344CB8AC3E}">
+        <p14:creationId xmlns:p14="http://schemas.microsoft.com/office/powerpoint/2010/main" val="3280440723"/>
+      </p:ext>
+    </p:extLst>
+  </p:cSld>
+  <p:clrMapOvr>
+    <a:masterClrMapping/>
+  </p:clrMapOvr>
+</p:sld>
+</file>
+
+<file path=ppt/slides/slide3.xml><?xml version="1.0" encoding="utf-8"?>
 <p:sld xmlns:a="http://schemas.openxmlformats.org/drawingml/2006/main" xmlns:r="http://schemas.openxmlformats.org/officeDocument/2006/relationships" xmlns:p="http://schemas.openxmlformats.org/presentationml/2006/main">
   <p:cSld>
     <p:spTree>

</xml_diff>

<commit_message>
P3_Cleaning : quantity dans même unité+outliers, agrégé palm_oil, nettoyé serving_quant, éliminé colonnes sous_remplies : final shape (563352, 45) | P3_Analysis : export figure msno - classement des colonnes pour traitement en 4 catégories - (stratégie d'imputation) cat1 OK - cat2 démarré un knn regressor best k=13 - 62,5%, picklé le modèle
</commit_message>
<xml_diff>
--- a/SOUTENANCE/Projet3.pptx
+++ b/SOUTENANCE/Projet3.pptx
@@ -6,8 +6,27 @@
   </p:sldMasterIdLst>
   <p:sldIdLst>
     <p:sldId id="256" r:id="rId2"/>
-    <p:sldId id="258" r:id="rId3"/>
-    <p:sldId id="257" r:id="rId4"/>
+    <p:sldId id="276" r:id="rId3"/>
+    <p:sldId id="258" r:id="rId4"/>
+    <p:sldId id="259" r:id="rId5"/>
+    <p:sldId id="260" r:id="rId6"/>
+    <p:sldId id="257" r:id="rId7"/>
+    <p:sldId id="261" r:id="rId8"/>
+    <p:sldId id="277" r:id="rId9"/>
+    <p:sldId id="262" r:id="rId10"/>
+    <p:sldId id="263" r:id="rId11"/>
+    <p:sldId id="264" r:id="rId12"/>
+    <p:sldId id="265" r:id="rId13"/>
+    <p:sldId id="266" r:id="rId14"/>
+    <p:sldId id="267" r:id="rId15"/>
+    <p:sldId id="268" r:id="rId16"/>
+    <p:sldId id="269" r:id="rId17"/>
+    <p:sldId id="270" r:id="rId18"/>
+    <p:sldId id="271" r:id="rId19"/>
+    <p:sldId id="272" r:id="rId20"/>
+    <p:sldId id="273" r:id="rId21"/>
+    <p:sldId id="274" r:id="rId22"/>
+    <p:sldId id="275" r:id="rId23"/>
   </p:sldIdLst>
   <p:sldSz cx="9144000" cy="6858000" type="screen4x3"/>
   <p:notesSz cx="6858000" cy="9144000"/>
@@ -290,7 +309,7 @@
           <a:p>
             <a:fld id="{63B6431C-D98E-4054-AC85-4318E682A8C6}" type="datetimeFigureOut">
               <a:rPr lang="fr-FR" smtClean="0"/>
-              <a:t>01/06/2020</a:t>
+              <a:t>04/06/2020</a:t>
             </a:fld>
             <a:endParaRPr lang="fr-FR"/>
           </a:p>
@@ -460,7 +479,7 @@
           <a:p>
             <a:fld id="{63B6431C-D98E-4054-AC85-4318E682A8C6}" type="datetimeFigureOut">
               <a:rPr lang="fr-FR" smtClean="0"/>
-              <a:t>01/06/2020</a:t>
+              <a:t>04/06/2020</a:t>
             </a:fld>
             <a:endParaRPr lang="fr-FR"/>
           </a:p>
@@ -640,7 +659,7 @@
           <a:p>
             <a:fld id="{63B6431C-D98E-4054-AC85-4318E682A8C6}" type="datetimeFigureOut">
               <a:rPr lang="fr-FR" smtClean="0"/>
-              <a:t>01/06/2020</a:t>
+              <a:t>04/06/2020</a:t>
             </a:fld>
             <a:endParaRPr lang="fr-FR"/>
           </a:p>
@@ -810,7 +829,7 @@
           <a:p>
             <a:fld id="{63B6431C-D98E-4054-AC85-4318E682A8C6}" type="datetimeFigureOut">
               <a:rPr lang="fr-FR" smtClean="0"/>
-              <a:t>01/06/2020</a:t>
+              <a:t>04/06/2020</a:t>
             </a:fld>
             <a:endParaRPr lang="fr-FR"/>
           </a:p>
@@ -1056,7 +1075,7 @@
           <a:p>
             <a:fld id="{63B6431C-D98E-4054-AC85-4318E682A8C6}" type="datetimeFigureOut">
               <a:rPr lang="fr-FR" smtClean="0"/>
-              <a:t>01/06/2020</a:t>
+              <a:t>04/06/2020</a:t>
             </a:fld>
             <a:endParaRPr lang="fr-FR"/>
           </a:p>
@@ -1344,7 +1363,7 @@
           <a:p>
             <a:fld id="{63B6431C-D98E-4054-AC85-4318E682A8C6}" type="datetimeFigureOut">
               <a:rPr lang="fr-FR" smtClean="0"/>
-              <a:t>01/06/2020</a:t>
+              <a:t>04/06/2020</a:t>
             </a:fld>
             <a:endParaRPr lang="fr-FR"/>
           </a:p>
@@ -1766,7 +1785,7 @@
           <a:p>
             <a:fld id="{63B6431C-D98E-4054-AC85-4318E682A8C6}" type="datetimeFigureOut">
               <a:rPr lang="fr-FR" smtClean="0"/>
-              <a:t>01/06/2020</a:t>
+              <a:t>04/06/2020</a:t>
             </a:fld>
             <a:endParaRPr lang="fr-FR"/>
           </a:p>
@@ -1884,7 +1903,7 @@
           <a:p>
             <a:fld id="{63B6431C-D98E-4054-AC85-4318E682A8C6}" type="datetimeFigureOut">
               <a:rPr lang="fr-FR" smtClean="0"/>
-              <a:t>01/06/2020</a:t>
+              <a:t>04/06/2020</a:t>
             </a:fld>
             <a:endParaRPr lang="fr-FR"/>
           </a:p>
@@ -1979,7 +1998,7 @@
           <a:p>
             <a:fld id="{63B6431C-D98E-4054-AC85-4318E682A8C6}" type="datetimeFigureOut">
               <a:rPr lang="fr-FR" smtClean="0"/>
-              <a:t>01/06/2020</a:t>
+              <a:t>04/06/2020</a:t>
             </a:fld>
             <a:endParaRPr lang="fr-FR"/>
           </a:p>
@@ -2256,7 +2275,7 @@
           <a:p>
             <a:fld id="{63B6431C-D98E-4054-AC85-4318E682A8C6}" type="datetimeFigureOut">
               <a:rPr lang="fr-FR" smtClean="0"/>
-              <a:t>01/06/2020</a:t>
+              <a:t>04/06/2020</a:t>
             </a:fld>
             <a:endParaRPr lang="fr-FR"/>
           </a:p>
@@ -2509,7 +2528,7 @@
           <a:p>
             <a:fld id="{63B6431C-D98E-4054-AC85-4318E682A8C6}" type="datetimeFigureOut">
               <a:rPr lang="fr-FR" smtClean="0"/>
-              <a:t>01/06/2020</a:t>
+              <a:t>04/06/2020</a:t>
             </a:fld>
             <a:endParaRPr lang="fr-FR"/>
           </a:p>
@@ -2722,7 +2741,7 @@
           <a:p>
             <a:fld id="{63B6431C-D98E-4054-AC85-4318E682A8C6}" type="datetimeFigureOut">
               <a:rPr lang="fr-FR" smtClean="0"/>
-              <a:t>01/06/2020</a:t>
+              <a:t>04/06/2020</a:t>
             </a:fld>
             <a:endParaRPr lang="fr-FR"/>
           </a:p>
@@ -3197,6 +3216,496 @@
 </p:sld>
 </file>
 
+<file path=ppt/slides/slide10.xml><?xml version="1.0" encoding="utf-8"?>
+<p:sld xmlns:a="http://schemas.openxmlformats.org/drawingml/2006/main" xmlns:r="http://schemas.openxmlformats.org/officeDocument/2006/relationships" xmlns:p="http://schemas.openxmlformats.org/presentationml/2006/main">
+  <p:cSld>
+    <p:spTree>
+      <p:nvGrpSpPr>
+        <p:cNvPr id="1" name=""/>
+        <p:cNvGrpSpPr/>
+        <p:nvPr/>
+      </p:nvGrpSpPr>
+      <p:grpSpPr>
+        <a:xfrm>
+          <a:off x="0" y="0"/>
+          <a:ext cx="0" cy="0"/>
+          <a:chOff x="0" y="0"/>
+          <a:chExt cx="0" cy="0"/>
+        </a:xfrm>
+      </p:grpSpPr>
+      <p:sp>
+        <p:nvSpPr>
+          <p:cNvPr id="2" name="Titre 1"/>
+          <p:cNvSpPr>
+            <a:spLocks noGrp="1"/>
+          </p:cNvSpPr>
+          <p:nvPr>
+            <p:ph type="title"/>
+          </p:nvPr>
+        </p:nvSpPr>
+        <p:spPr/>
+        <p:txBody>
+          <a:bodyPr/>
+          <a:lstStyle/>
+          <a:p>
+            <a:endParaRPr lang="fr-FR"/>
+          </a:p>
+        </p:txBody>
+      </p:sp>
+    </p:spTree>
+    <p:extLst>
+      <p:ext uri="{BB962C8B-B14F-4D97-AF65-F5344CB8AC3E}">
+        <p14:creationId xmlns:p14="http://schemas.microsoft.com/office/powerpoint/2010/main" val="1442663056"/>
+      </p:ext>
+    </p:extLst>
+  </p:cSld>
+  <p:clrMapOvr>
+    <a:masterClrMapping/>
+  </p:clrMapOvr>
+</p:sld>
+</file>
+
+<file path=ppt/slides/slide11.xml><?xml version="1.0" encoding="utf-8"?>
+<p:sld xmlns:a="http://schemas.openxmlformats.org/drawingml/2006/main" xmlns:r="http://schemas.openxmlformats.org/officeDocument/2006/relationships" xmlns:p="http://schemas.openxmlformats.org/presentationml/2006/main">
+  <p:cSld>
+    <p:spTree>
+      <p:nvGrpSpPr>
+        <p:cNvPr id="1" name=""/>
+        <p:cNvGrpSpPr/>
+        <p:nvPr/>
+      </p:nvGrpSpPr>
+      <p:grpSpPr>
+        <a:xfrm>
+          <a:off x="0" y="0"/>
+          <a:ext cx="0" cy="0"/>
+          <a:chOff x="0" y="0"/>
+          <a:chExt cx="0" cy="0"/>
+        </a:xfrm>
+      </p:grpSpPr>
+      <p:sp>
+        <p:nvSpPr>
+          <p:cNvPr id="2" name="Titre 1"/>
+          <p:cNvSpPr>
+            <a:spLocks noGrp="1"/>
+          </p:cNvSpPr>
+          <p:nvPr>
+            <p:ph type="title"/>
+          </p:nvPr>
+        </p:nvSpPr>
+        <p:spPr/>
+        <p:txBody>
+          <a:bodyPr/>
+          <a:lstStyle/>
+          <a:p>
+            <a:endParaRPr lang="fr-FR"/>
+          </a:p>
+        </p:txBody>
+      </p:sp>
+    </p:spTree>
+    <p:extLst>
+      <p:ext uri="{BB962C8B-B14F-4D97-AF65-F5344CB8AC3E}">
+        <p14:creationId xmlns:p14="http://schemas.microsoft.com/office/powerpoint/2010/main" val="1077493983"/>
+      </p:ext>
+    </p:extLst>
+  </p:cSld>
+  <p:clrMapOvr>
+    <a:masterClrMapping/>
+  </p:clrMapOvr>
+</p:sld>
+</file>
+
+<file path=ppt/slides/slide12.xml><?xml version="1.0" encoding="utf-8"?>
+<p:sld xmlns:a="http://schemas.openxmlformats.org/drawingml/2006/main" xmlns:r="http://schemas.openxmlformats.org/officeDocument/2006/relationships" xmlns:p="http://schemas.openxmlformats.org/presentationml/2006/main">
+  <p:cSld>
+    <p:spTree>
+      <p:nvGrpSpPr>
+        <p:cNvPr id="1" name=""/>
+        <p:cNvGrpSpPr/>
+        <p:nvPr/>
+      </p:nvGrpSpPr>
+      <p:grpSpPr>
+        <a:xfrm>
+          <a:off x="0" y="0"/>
+          <a:ext cx="0" cy="0"/>
+          <a:chOff x="0" y="0"/>
+          <a:chExt cx="0" cy="0"/>
+        </a:xfrm>
+      </p:grpSpPr>
+      <p:sp>
+        <p:nvSpPr>
+          <p:cNvPr id="2" name="Titre 1"/>
+          <p:cNvSpPr>
+            <a:spLocks noGrp="1"/>
+          </p:cNvSpPr>
+          <p:nvPr>
+            <p:ph type="title"/>
+          </p:nvPr>
+        </p:nvSpPr>
+        <p:spPr/>
+        <p:txBody>
+          <a:bodyPr/>
+          <a:lstStyle/>
+          <a:p>
+            <a:endParaRPr lang="fr-FR"/>
+          </a:p>
+        </p:txBody>
+      </p:sp>
+    </p:spTree>
+    <p:extLst>
+      <p:ext uri="{BB962C8B-B14F-4D97-AF65-F5344CB8AC3E}">
+        <p14:creationId xmlns:p14="http://schemas.microsoft.com/office/powerpoint/2010/main" val="3868011724"/>
+      </p:ext>
+    </p:extLst>
+  </p:cSld>
+  <p:clrMapOvr>
+    <a:masterClrMapping/>
+  </p:clrMapOvr>
+</p:sld>
+</file>
+
+<file path=ppt/slides/slide13.xml><?xml version="1.0" encoding="utf-8"?>
+<p:sld xmlns:a="http://schemas.openxmlformats.org/drawingml/2006/main" xmlns:r="http://schemas.openxmlformats.org/officeDocument/2006/relationships" xmlns:p="http://schemas.openxmlformats.org/presentationml/2006/main">
+  <p:cSld>
+    <p:spTree>
+      <p:nvGrpSpPr>
+        <p:cNvPr id="1" name=""/>
+        <p:cNvGrpSpPr/>
+        <p:nvPr/>
+      </p:nvGrpSpPr>
+      <p:grpSpPr>
+        <a:xfrm>
+          <a:off x="0" y="0"/>
+          <a:ext cx="0" cy="0"/>
+          <a:chOff x="0" y="0"/>
+          <a:chExt cx="0" cy="0"/>
+        </a:xfrm>
+      </p:grpSpPr>
+      <p:sp>
+        <p:nvSpPr>
+          <p:cNvPr id="2" name="Titre 1"/>
+          <p:cNvSpPr>
+            <a:spLocks noGrp="1"/>
+          </p:cNvSpPr>
+          <p:nvPr>
+            <p:ph type="title"/>
+          </p:nvPr>
+        </p:nvSpPr>
+        <p:spPr/>
+        <p:txBody>
+          <a:bodyPr/>
+          <a:lstStyle/>
+          <a:p>
+            <a:endParaRPr lang="fr-FR"/>
+          </a:p>
+        </p:txBody>
+      </p:sp>
+    </p:spTree>
+    <p:extLst>
+      <p:ext uri="{BB962C8B-B14F-4D97-AF65-F5344CB8AC3E}">
+        <p14:creationId xmlns:p14="http://schemas.microsoft.com/office/powerpoint/2010/main" val="535046701"/>
+      </p:ext>
+    </p:extLst>
+  </p:cSld>
+  <p:clrMapOvr>
+    <a:masterClrMapping/>
+  </p:clrMapOvr>
+</p:sld>
+</file>
+
+<file path=ppt/slides/slide14.xml><?xml version="1.0" encoding="utf-8"?>
+<p:sld xmlns:a="http://schemas.openxmlformats.org/drawingml/2006/main" xmlns:r="http://schemas.openxmlformats.org/officeDocument/2006/relationships" xmlns:p="http://schemas.openxmlformats.org/presentationml/2006/main">
+  <p:cSld>
+    <p:spTree>
+      <p:nvGrpSpPr>
+        <p:cNvPr id="1" name=""/>
+        <p:cNvGrpSpPr/>
+        <p:nvPr/>
+      </p:nvGrpSpPr>
+      <p:grpSpPr>
+        <a:xfrm>
+          <a:off x="0" y="0"/>
+          <a:ext cx="0" cy="0"/>
+          <a:chOff x="0" y="0"/>
+          <a:chExt cx="0" cy="0"/>
+        </a:xfrm>
+      </p:grpSpPr>
+      <p:sp>
+        <p:nvSpPr>
+          <p:cNvPr id="2" name="Titre 1"/>
+          <p:cNvSpPr>
+            <a:spLocks noGrp="1"/>
+          </p:cNvSpPr>
+          <p:nvPr>
+            <p:ph type="title"/>
+          </p:nvPr>
+        </p:nvSpPr>
+        <p:spPr/>
+        <p:txBody>
+          <a:bodyPr/>
+          <a:lstStyle/>
+          <a:p>
+            <a:endParaRPr lang="fr-FR"/>
+          </a:p>
+        </p:txBody>
+      </p:sp>
+    </p:spTree>
+    <p:extLst>
+      <p:ext uri="{BB962C8B-B14F-4D97-AF65-F5344CB8AC3E}">
+        <p14:creationId xmlns:p14="http://schemas.microsoft.com/office/powerpoint/2010/main" val="3773842338"/>
+      </p:ext>
+    </p:extLst>
+  </p:cSld>
+  <p:clrMapOvr>
+    <a:masterClrMapping/>
+  </p:clrMapOvr>
+</p:sld>
+</file>
+
+<file path=ppt/slides/slide15.xml><?xml version="1.0" encoding="utf-8"?>
+<p:sld xmlns:a="http://schemas.openxmlformats.org/drawingml/2006/main" xmlns:r="http://schemas.openxmlformats.org/officeDocument/2006/relationships" xmlns:p="http://schemas.openxmlformats.org/presentationml/2006/main">
+  <p:cSld>
+    <p:spTree>
+      <p:nvGrpSpPr>
+        <p:cNvPr id="1" name=""/>
+        <p:cNvGrpSpPr/>
+        <p:nvPr/>
+      </p:nvGrpSpPr>
+      <p:grpSpPr>
+        <a:xfrm>
+          <a:off x="0" y="0"/>
+          <a:ext cx="0" cy="0"/>
+          <a:chOff x="0" y="0"/>
+          <a:chExt cx="0" cy="0"/>
+        </a:xfrm>
+      </p:grpSpPr>
+      <p:sp>
+        <p:nvSpPr>
+          <p:cNvPr id="2" name="Titre 1"/>
+          <p:cNvSpPr>
+            <a:spLocks noGrp="1"/>
+          </p:cNvSpPr>
+          <p:nvPr>
+            <p:ph type="title"/>
+          </p:nvPr>
+        </p:nvSpPr>
+        <p:spPr/>
+        <p:txBody>
+          <a:bodyPr/>
+          <a:lstStyle/>
+          <a:p>
+            <a:endParaRPr lang="fr-FR"/>
+          </a:p>
+        </p:txBody>
+      </p:sp>
+    </p:spTree>
+    <p:extLst>
+      <p:ext uri="{BB962C8B-B14F-4D97-AF65-F5344CB8AC3E}">
+        <p14:creationId xmlns:p14="http://schemas.microsoft.com/office/powerpoint/2010/main" val="4166305879"/>
+      </p:ext>
+    </p:extLst>
+  </p:cSld>
+  <p:clrMapOvr>
+    <a:masterClrMapping/>
+  </p:clrMapOvr>
+</p:sld>
+</file>
+
+<file path=ppt/slides/slide16.xml><?xml version="1.0" encoding="utf-8"?>
+<p:sld xmlns:a="http://schemas.openxmlformats.org/drawingml/2006/main" xmlns:r="http://schemas.openxmlformats.org/officeDocument/2006/relationships" xmlns:p="http://schemas.openxmlformats.org/presentationml/2006/main">
+  <p:cSld>
+    <p:spTree>
+      <p:nvGrpSpPr>
+        <p:cNvPr id="1" name=""/>
+        <p:cNvGrpSpPr/>
+        <p:nvPr/>
+      </p:nvGrpSpPr>
+      <p:grpSpPr>
+        <a:xfrm>
+          <a:off x="0" y="0"/>
+          <a:ext cx="0" cy="0"/>
+          <a:chOff x="0" y="0"/>
+          <a:chExt cx="0" cy="0"/>
+        </a:xfrm>
+      </p:grpSpPr>
+      <p:sp>
+        <p:nvSpPr>
+          <p:cNvPr id="2" name="Titre 1"/>
+          <p:cNvSpPr>
+            <a:spLocks noGrp="1"/>
+          </p:cNvSpPr>
+          <p:nvPr>
+            <p:ph type="title"/>
+          </p:nvPr>
+        </p:nvSpPr>
+        <p:spPr/>
+        <p:txBody>
+          <a:bodyPr/>
+          <a:lstStyle/>
+          <a:p>
+            <a:endParaRPr lang="fr-FR"/>
+          </a:p>
+        </p:txBody>
+      </p:sp>
+    </p:spTree>
+    <p:extLst>
+      <p:ext uri="{BB962C8B-B14F-4D97-AF65-F5344CB8AC3E}">
+        <p14:creationId xmlns:p14="http://schemas.microsoft.com/office/powerpoint/2010/main" val="483053284"/>
+      </p:ext>
+    </p:extLst>
+  </p:cSld>
+  <p:clrMapOvr>
+    <a:masterClrMapping/>
+  </p:clrMapOvr>
+</p:sld>
+</file>
+
+<file path=ppt/slides/slide17.xml><?xml version="1.0" encoding="utf-8"?>
+<p:sld xmlns:a="http://schemas.openxmlformats.org/drawingml/2006/main" xmlns:r="http://schemas.openxmlformats.org/officeDocument/2006/relationships" xmlns:p="http://schemas.openxmlformats.org/presentationml/2006/main">
+  <p:cSld>
+    <p:spTree>
+      <p:nvGrpSpPr>
+        <p:cNvPr id="1" name=""/>
+        <p:cNvGrpSpPr/>
+        <p:nvPr/>
+      </p:nvGrpSpPr>
+      <p:grpSpPr>
+        <a:xfrm>
+          <a:off x="0" y="0"/>
+          <a:ext cx="0" cy="0"/>
+          <a:chOff x="0" y="0"/>
+          <a:chExt cx="0" cy="0"/>
+        </a:xfrm>
+      </p:grpSpPr>
+      <p:sp>
+        <p:nvSpPr>
+          <p:cNvPr id="2" name="Titre 1"/>
+          <p:cNvSpPr>
+            <a:spLocks noGrp="1"/>
+          </p:cNvSpPr>
+          <p:nvPr>
+            <p:ph type="title"/>
+          </p:nvPr>
+        </p:nvSpPr>
+        <p:spPr/>
+        <p:txBody>
+          <a:bodyPr/>
+          <a:lstStyle/>
+          <a:p>
+            <a:endParaRPr lang="fr-FR"/>
+          </a:p>
+        </p:txBody>
+      </p:sp>
+    </p:spTree>
+    <p:extLst>
+      <p:ext uri="{BB962C8B-B14F-4D97-AF65-F5344CB8AC3E}">
+        <p14:creationId xmlns:p14="http://schemas.microsoft.com/office/powerpoint/2010/main" val="1140336248"/>
+      </p:ext>
+    </p:extLst>
+  </p:cSld>
+  <p:clrMapOvr>
+    <a:masterClrMapping/>
+  </p:clrMapOvr>
+</p:sld>
+</file>
+
+<file path=ppt/slides/slide18.xml><?xml version="1.0" encoding="utf-8"?>
+<p:sld xmlns:a="http://schemas.openxmlformats.org/drawingml/2006/main" xmlns:r="http://schemas.openxmlformats.org/officeDocument/2006/relationships" xmlns:p="http://schemas.openxmlformats.org/presentationml/2006/main">
+  <p:cSld>
+    <p:spTree>
+      <p:nvGrpSpPr>
+        <p:cNvPr id="1" name=""/>
+        <p:cNvGrpSpPr/>
+        <p:nvPr/>
+      </p:nvGrpSpPr>
+      <p:grpSpPr>
+        <a:xfrm>
+          <a:off x="0" y="0"/>
+          <a:ext cx="0" cy="0"/>
+          <a:chOff x="0" y="0"/>
+          <a:chExt cx="0" cy="0"/>
+        </a:xfrm>
+      </p:grpSpPr>
+      <p:sp>
+        <p:nvSpPr>
+          <p:cNvPr id="2" name="Titre 1"/>
+          <p:cNvSpPr>
+            <a:spLocks noGrp="1"/>
+          </p:cNvSpPr>
+          <p:nvPr>
+            <p:ph type="title"/>
+          </p:nvPr>
+        </p:nvSpPr>
+        <p:spPr/>
+        <p:txBody>
+          <a:bodyPr/>
+          <a:lstStyle/>
+          <a:p>
+            <a:endParaRPr lang="fr-FR"/>
+          </a:p>
+        </p:txBody>
+      </p:sp>
+    </p:spTree>
+    <p:extLst>
+      <p:ext uri="{BB962C8B-B14F-4D97-AF65-F5344CB8AC3E}">
+        <p14:creationId xmlns:p14="http://schemas.microsoft.com/office/powerpoint/2010/main" val="1160108065"/>
+      </p:ext>
+    </p:extLst>
+  </p:cSld>
+  <p:clrMapOvr>
+    <a:masterClrMapping/>
+  </p:clrMapOvr>
+</p:sld>
+</file>
+
+<file path=ppt/slides/slide19.xml><?xml version="1.0" encoding="utf-8"?>
+<p:sld xmlns:a="http://schemas.openxmlformats.org/drawingml/2006/main" xmlns:r="http://schemas.openxmlformats.org/officeDocument/2006/relationships" xmlns:p="http://schemas.openxmlformats.org/presentationml/2006/main">
+  <p:cSld>
+    <p:spTree>
+      <p:nvGrpSpPr>
+        <p:cNvPr id="1" name=""/>
+        <p:cNvGrpSpPr/>
+        <p:nvPr/>
+      </p:nvGrpSpPr>
+      <p:grpSpPr>
+        <a:xfrm>
+          <a:off x="0" y="0"/>
+          <a:ext cx="0" cy="0"/>
+          <a:chOff x="0" y="0"/>
+          <a:chExt cx="0" cy="0"/>
+        </a:xfrm>
+      </p:grpSpPr>
+      <p:sp>
+        <p:nvSpPr>
+          <p:cNvPr id="2" name="Titre 1"/>
+          <p:cNvSpPr>
+            <a:spLocks noGrp="1"/>
+          </p:cNvSpPr>
+          <p:nvPr>
+            <p:ph type="title"/>
+          </p:nvPr>
+        </p:nvSpPr>
+        <p:spPr/>
+        <p:txBody>
+          <a:bodyPr/>
+          <a:lstStyle/>
+          <a:p>
+            <a:endParaRPr lang="fr-FR"/>
+          </a:p>
+        </p:txBody>
+      </p:sp>
+    </p:spTree>
+    <p:extLst>
+      <p:ext uri="{BB962C8B-B14F-4D97-AF65-F5344CB8AC3E}">
+        <p14:creationId xmlns:p14="http://schemas.microsoft.com/office/powerpoint/2010/main" val="2537692123"/>
+      </p:ext>
+    </p:extLst>
+  </p:cSld>
+  <p:clrMapOvr>
+    <a:masterClrMapping/>
+  </p:clrMapOvr>
+</p:sld>
+</file>
+
 <file path=ppt/slides/slide2.xml><?xml version="1.0" encoding="utf-8"?>
 <p:sld xmlns:a="http://schemas.openxmlformats.org/drawingml/2006/main" xmlns:r="http://schemas.openxmlformats.org/officeDocument/2006/relationships" xmlns:p="http://schemas.openxmlformats.org/presentationml/2006/main">
   <p:cSld>
@@ -3231,40 +3740,24 @@
           </a:bodyPr>
           <a:lstStyle/>
           <a:p>
-            <a:pPr algn="l"/>
-            <a:r>
-              <a:rPr lang="fr-FR" b="1" dirty="0" smtClean="0"/>
-              <a:t>Base de donnée </a:t>
-            </a:r>
-            <a:r>
-              <a:rPr lang="fr-FR" b="1" dirty="0" err="1" smtClean="0"/>
-              <a:t>OpenFoodFacts</a:t>
-            </a:r>
-            <a:r>
-              <a:rPr lang="fr-FR" dirty="0" smtClean="0"/>
-              <a:t/>
-            </a:r>
-            <a:br>
-              <a:rPr lang="fr-FR" dirty="0" smtClean="0"/>
-            </a:br>
-            <a:r>
-              <a:rPr lang="fr-FR" sz="3600" dirty="0" smtClean="0"/>
-              <a:t>Application innovante en lien avec l’alimentation</a:t>
-            </a:r>
-            <a:endParaRPr lang="fr-FR" sz="3600" dirty="0"/>
-          </a:p>
-        </p:txBody>
-      </p:sp>
-      <p:sp>
-        <p:nvSpPr>
-          <p:cNvPr id="3" name="ZoneTexte 2"/>
+            <a:r>
+              <a:rPr lang="fr-FR" b="1" dirty="0"/>
+              <a:t>Concevez une application au service de la santé publique</a:t>
+            </a:r>
+            <a:endParaRPr lang="fr-FR" dirty="0"/>
+          </a:p>
+        </p:txBody>
+      </p:sp>
+      <p:sp>
+        <p:nvSpPr>
+          <p:cNvPr id="4" name="ZoneTexte 3"/>
           <p:cNvSpPr txBox="1"/>
           <p:nvPr/>
         </p:nvSpPr>
         <p:spPr>
           <a:xfrm>
-            <a:off x="467544" y="2132856"/>
-            <a:ext cx="8064896" cy="2862322"/>
+            <a:off x="3419872" y="2206174"/>
+            <a:ext cx="2304256" cy="523220"/>
           </a:xfrm>
           <a:prstGeom prst="rect">
             <a:avLst/>
@@ -3277,67 +3770,256 @@
           </a:bodyPr>
           <a:lstStyle/>
           <a:p>
-            <a:r>
-              <a:rPr lang="fr-FR" dirty="0" smtClean="0"/>
-              <a:t>Une application qui permet de donner à un utilisateur  des suggestions de produits similaires en améliorant ou changeant des paramètres de son choix (marque, pays, plus sains, plus énergétiques,  emballage, quantité, plus vitaminé…)</a:t>
-            </a:r>
-          </a:p>
+            <a:pPr algn="ctr"/>
+            <a:r>
+              <a:rPr lang="fr-FR" sz="2800" b="1" dirty="0" smtClean="0"/>
+              <a:t>Nettoyage</a:t>
+            </a:r>
+            <a:endParaRPr lang="fr-FR" sz="2800" b="1" dirty="0"/>
+          </a:p>
+        </p:txBody>
+      </p:sp>
+      <p:sp>
+        <p:nvSpPr>
+          <p:cNvPr id="5" name="ZoneTexte 4"/>
+          <p:cNvSpPr txBox="1"/>
+          <p:nvPr/>
+        </p:nvSpPr>
+        <p:spPr>
+          <a:xfrm>
+            <a:off x="6012160" y="3789040"/>
+            <a:ext cx="2304256" cy="523220"/>
+          </a:xfrm>
+          <a:prstGeom prst="rect">
+            <a:avLst/>
+          </a:prstGeom>
+          <a:noFill/>
+        </p:spPr>
+        <p:txBody>
+          <a:bodyPr wrap="square" rtlCol="0">
+            <a:spAutoFit/>
+          </a:bodyPr>
+          <a:lstStyle/>
+          <a:p>
+            <a:pPr algn="ctr"/>
+            <a:r>
+              <a:rPr lang="fr-FR" sz="2800" b="1" dirty="0" smtClean="0"/>
+              <a:t>Analyse</a:t>
+            </a:r>
+            <a:endParaRPr lang="fr-FR" sz="2800" b="1" dirty="0"/>
+          </a:p>
+        </p:txBody>
+      </p:sp>
+      <p:sp>
+        <p:nvSpPr>
+          <p:cNvPr id="6" name="ZoneTexte 5"/>
+          <p:cNvSpPr txBox="1"/>
+          <p:nvPr/>
+        </p:nvSpPr>
+        <p:spPr>
+          <a:xfrm>
+            <a:off x="971600" y="3789040"/>
+            <a:ext cx="2304256" cy="523220"/>
+          </a:xfrm>
+          <a:prstGeom prst="rect">
+            <a:avLst/>
+          </a:prstGeom>
+          <a:noFill/>
+        </p:spPr>
+        <p:txBody>
+          <a:bodyPr wrap="square" rtlCol="0">
+            <a:spAutoFit/>
+          </a:bodyPr>
+          <a:lstStyle/>
+          <a:p>
+            <a:pPr algn="ctr"/>
+            <a:r>
+              <a:rPr lang="fr-FR" sz="2800" b="1" dirty="0" smtClean="0"/>
+              <a:t>Application</a:t>
+            </a:r>
+            <a:endParaRPr lang="fr-FR" sz="2800" b="1" dirty="0"/>
+          </a:p>
+        </p:txBody>
+      </p:sp>
+      <p:sp>
+        <p:nvSpPr>
+          <p:cNvPr id="7" name="Espace réservé du contenu 6"/>
+          <p:cNvSpPr>
+            <a:spLocks noGrp="1"/>
+          </p:cNvSpPr>
+          <p:nvPr>
+            <p:ph idx="1"/>
+          </p:nvPr>
+        </p:nvSpPr>
+        <p:spPr>
+          <a:xfrm>
+            <a:off x="457200" y="5157192"/>
+            <a:ext cx="8229600" cy="968971"/>
+          </a:xfrm>
+        </p:spPr>
+        <p:txBody>
+          <a:bodyPr/>
+          <a:lstStyle/>
           <a:p>
             <a:endParaRPr lang="fr-FR" dirty="0"/>
-          </a:p>
-          <a:p>
-            <a:r>
-              <a:rPr lang="fr-FR" dirty="0" smtClean="0"/>
-              <a:t>Fonctionnalités offertes :</a:t>
-            </a:r>
-          </a:p>
-          <a:p>
-            <a:pPr marL="285750" indent="-285750">
-              <a:buFontTx/>
-              <a:buChar char="-"/>
-            </a:pPr>
-            <a:r>
-              <a:rPr lang="fr-FR" dirty="0" smtClean="0"/>
-              <a:t>Affichage des articles sur une carte par similarité</a:t>
-            </a:r>
-          </a:p>
-          <a:p>
-            <a:pPr marL="285750" indent="-285750">
-              <a:buFontTx/>
-              <a:buChar char="-"/>
-            </a:pPr>
-            <a:r>
-              <a:rPr lang="fr-FR" dirty="0" smtClean="0"/>
-              <a:t>Note de l’article pour chaque variable parmi ceux qui sont similaires</a:t>
-            </a:r>
-          </a:p>
-          <a:p>
-            <a:pPr marL="285750" indent="-285750">
-              <a:buFontTx/>
-              <a:buChar char="-"/>
-            </a:pPr>
-            <a:endParaRPr lang="fr-FR" dirty="0"/>
-          </a:p>
-          <a:p>
-            <a:pPr marL="285750" indent="-285750">
-              <a:buFontTx/>
-              <a:buChar char="-"/>
-            </a:pPr>
-            <a:endParaRPr lang="fr-FR" dirty="0" smtClean="0"/>
-          </a:p>
-          <a:p>
-            <a:pPr marL="285750" indent="-285750">
-              <a:buFontTx/>
-              <a:buChar char="-"/>
-            </a:pPr>
-            <a:endParaRPr lang="fr-FR" dirty="0" smtClean="0"/>
           </a:p>
         </p:txBody>
       </p:sp>
     </p:spTree>
     <p:extLst>
       <p:ext uri="{BB962C8B-B14F-4D97-AF65-F5344CB8AC3E}">
-        <p14:creationId xmlns:p14="http://schemas.microsoft.com/office/powerpoint/2010/main" val="3280440723"/>
+        <p14:creationId xmlns:p14="http://schemas.microsoft.com/office/powerpoint/2010/main" val="4168484279"/>
+      </p:ext>
+    </p:extLst>
+  </p:cSld>
+  <p:clrMapOvr>
+    <a:masterClrMapping/>
+  </p:clrMapOvr>
+</p:sld>
+</file>
+
+<file path=ppt/slides/slide20.xml><?xml version="1.0" encoding="utf-8"?>
+<p:sld xmlns:a="http://schemas.openxmlformats.org/drawingml/2006/main" xmlns:r="http://schemas.openxmlformats.org/officeDocument/2006/relationships" xmlns:p="http://schemas.openxmlformats.org/presentationml/2006/main">
+  <p:cSld>
+    <p:spTree>
+      <p:nvGrpSpPr>
+        <p:cNvPr id="1" name=""/>
+        <p:cNvGrpSpPr/>
+        <p:nvPr/>
+      </p:nvGrpSpPr>
+      <p:grpSpPr>
+        <a:xfrm>
+          <a:off x="0" y="0"/>
+          <a:ext cx="0" cy="0"/>
+          <a:chOff x="0" y="0"/>
+          <a:chExt cx="0" cy="0"/>
+        </a:xfrm>
+      </p:grpSpPr>
+      <p:sp>
+        <p:nvSpPr>
+          <p:cNvPr id="2" name="Titre 1"/>
+          <p:cNvSpPr>
+            <a:spLocks noGrp="1"/>
+          </p:cNvSpPr>
+          <p:nvPr>
+            <p:ph type="title"/>
+          </p:nvPr>
+        </p:nvSpPr>
+        <p:spPr/>
+        <p:txBody>
+          <a:bodyPr/>
+          <a:lstStyle/>
+          <a:p>
+            <a:endParaRPr lang="fr-FR"/>
+          </a:p>
+        </p:txBody>
+      </p:sp>
+    </p:spTree>
+    <p:extLst>
+      <p:ext uri="{BB962C8B-B14F-4D97-AF65-F5344CB8AC3E}">
+        <p14:creationId xmlns:p14="http://schemas.microsoft.com/office/powerpoint/2010/main" val="694029547"/>
+      </p:ext>
+    </p:extLst>
+  </p:cSld>
+  <p:clrMapOvr>
+    <a:masterClrMapping/>
+  </p:clrMapOvr>
+</p:sld>
+</file>
+
+<file path=ppt/slides/slide21.xml><?xml version="1.0" encoding="utf-8"?>
+<p:sld xmlns:a="http://schemas.openxmlformats.org/drawingml/2006/main" xmlns:r="http://schemas.openxmlformats.org/officeDocument/2006/relationships" xmlns:p="http://schemas.openxmlformats.org/presentationml/2006/main">
+  <p:cSld>
+    <p:spTree>
+      <p:nvGrpSpPr>
+        <p:cNvPr id="1" name=""/>
+        <p:cNvGrpSpPr/>
+        <p:nvPr/>
+      </p:nvGrpSpPr>
+      <p:grpSpPr>
+        <a:xfrm>
+          <a:off x="0" y="0"/>
+          <a:ext cx="0" cy="0"/>
+          <a:chOff x="0" y="0"/>
+          <a:chExt cx="0" cy="0"/>
+        </a:xfrm>
+      </p:grpSpPr>
+      <p:sp>
+        <p:nvSpPr>
+          <p:cNvPr id="2" name="Titre 1"/>
+          <p:cNvSpPr>
+            <a:spLocks noGrp="1"/>
+          </p:cNvSpPr>
+          <p:nvPr>
+            <p:ph type="title"/>
+          </p:nvPr>
+        </p:nvSpPr>
+        <p:spPr/>
+        <p:txBody>
+          <a:bodyPr/>
+          <a:lstStyle/>
+          <a:p>
+            <a:endParaRPr lang="fr-FR"/>
+          </a:p>
+        </p:txBody>
+      </p:sp>
+    </p:spTree>
+    <p:extLst>
+      <p:ext uri="{BB962C8B-B14F-4D97-AF65-F5344CB8AC3E}">
+        <p14:creationId xmlns:p14="http://schemas.microsoft.com/office/powerpoint/2010/main" val="1980548917"/>
+      </p:ext>
+    </p:extLst>
+  </p:cSld>
+  <p:clrMapOvr>
+    <a:masterClrMapping/>
+  </p:clrMapOvr>
+</p:sld>
+</file>
+
+<file path=ppt/slides/slide22.xml><?xml version="1.0" encoding="utf-8"?>
+<p:sld xmlns:a="http://schemas.openxmlformats.org/drawingml/2006/main" xmlns:r="http://schemas.openxmlformats.org/officeDocument/2006/relationships" xmlns:p="http://schemas.openxmlformats.org/presentationml/2006/main">
+  <p:cSld>
+    <p:spTree>
+      <p:nvGrpSpPr>
+        <p:cNvPr id="1" name=""/>
+        <p:cNvGrpSpPr/>
+        <p:nvPr/>
+      </p:nvGrpSpPr>
+      <p:grpSpPr>
+        <a:xfrm>
+          <a:off x="0" y="0"/>
+          <a:ext cx="0" cy="0"/>
+          <a:chOff x="0" y="0"/>
+          <a:chExt cx="0" cy="0"/>
+        </a:xfrm>
+      </p:grpSpPr>
+      <p:sp>
+        <p:nvSpPr>
+          <p:cNvPr id="2" name="Titre 1"/>
+          <p:cNvSpPr>
+            <a:spLocks noGrp="1"/>
+          </p:cNvSpPr>
+          <p:nvPr>
+            <p:ph type="title"/>
+          </p:nvPr>
+        </p:nvSpPr>
+        <p:spPr/>
+        <p:txBody>
+          <a:bodyPr/>
+          <a:lstStyle/>
+          <a:p>
+            <a:r>
+              <a:rPr lang="fr-FR" dirty="0" smtClean="0"/>
+              <a:t>Pistes d’amélioration</a:t>
+            </a:r>
+            <a:endParaRPr lang="fr-FR" dirty="0"/>
+          </a:p>
+        </p:txBody>
+      </p:sp>
+    </p:spTree>
+    <p:extLst>
+      <p:ext uri="{BB962C8B-B14F-4D97-AF65-F5344CB8AC3E}">
+        <p14:creationId xmlns:p14="http://schemas.microsoft.com/office/powerpoint/2010/main" val="3016011660"/>
       </p:ext>
     </p:extLst>
   </p:cSld>
@@ -3376,14 +4058,265 @@
         </p:nvSpPr>
         <p:spPr/>
         <p:txBody>
-          <a:bodyPr/>
-          <a:lstStyle/>
-          <a:p>
-            <a:r>
-              <a:rPr lang="fr-FR" dirty="0" err="1" smtClean="0"/>
-              <a:t>Cleaning</a:t>
-            </a:r>
+          <a:bodyPr>
+            <a:normAutofit fontScale="90000"/>
+          </a:bodyPr>
+          <a:lstStyle/>
+          <a:p>
+            <a:pPr algn="l"/>
+            <a:r>
+              <a:rPr lang="fr-FR" b="1" dirty="0" smtClean="0"/>
+              <a:t>Base de donnée </a:t>
+            </a:r>
+            <a:r>
+              <a:rPr lang="fr-FR" b="1" dirty="0" err="1" smtClean="0"/>
+              <a:t>OpenFoodFacts</a:t>
+            </a:r>
+            <a:r>
+              <a:rPr lang="fr-FR" dirty="0" smtClean="0"/>
+              <a:t/>
+            </a:r>
+            <a:br>
+              <a:rPr lang="fr-FR" dirty="0" smtClean="0"/>
+            </a:br>
+            <a:r>
+              <a:rPr lang="fr-FR" sz="3600" dirty="0" smtClean="0"/>
+              <a:t>Application innovante en lien avec l’alimentation</a:t>
+            </a:r>
+            <a:endParaRPr lang="fr-FR" sz="3600" dirty="0"/>
+          </a:p>
+        </p:txBody>
+      </p:sp>
+      <p:sp>
+        <p:nvSpPr>
+          <p:cNvPr id="3" name="ZoneTexte 2"/>
+          <p:cNvSpPr txBox="1"/>
+          <p:nvPr/>
+        </p:nvSpPr>
+        <p:spPr>
+          <a:xfrm>
+            <a:off x="467544" y="2132856"/>
+            <a:ext cx="8064896" cy="2862322"/>
+          </a:xfrm>
+          <a:prstGeom prst="rect">
+            <a:avLst/>
+          </a:prstGeom>
+          <a:noFill/>
+        </p:spPr>
+        <p:txBody>
+          <a:bodyPr wrap="square" rtlCol="0">
+            <a:spAutoFit/>
+          </a:bodyPr>
+          <a:lstStyle/>
+          <a:p>
+            <a:r>
+              <a:rPr lang="fr-FR" dirty="0" smtClean="0"/>
+              <a:t>Une application qui permet de donner à un utilisateur  des suggestions de produits similaires en améliorant ou changeant des paramètres de son choix (marque, pays, plus sains, plus énergétiques,  emballage, quantité, plus vitaminé…)</a:t>
+            </a:r>
+          </a:p>
+          <a:p>
             <a:endParaRPr lang="fr-FR" dirty="0"/>
+          </a:p>
+          <a:p>
+            <a:r>
+              <a:rPr lang="fr-FR" dirty="0" smtClean="0"/>
+              <a:t>Fonctionnalités offertes :</a:t>
+            </a:r>
+          </a:p>
+          <a:p>
+            <a:pPr marL="285750" indent="-285750">
+              <a:buFontTx/>
+              <a:buChar char="-"/>
+            </a:pPr>
+            <a:r>
+              <a:rPr lang="fr-FR" dirty="0" smtClean="0"/>
+              <a:t>Affichage des articles sur une carte par similarité</a:t>
+            </a:r>
+          </a:p>
+          <a:p>
+            <a:pPr marL="285750" indent="-285750">
+              <a:buFontTx/>
+              <a:buChar char="-"/>
+            </a:pPr>
+            <a:r>
+              <a:rPr lang="fr-FR" dirty="0" smtClean="0"/>
+              <a:t>Note de l’article pour chaque variable parmi ceux qui sont similaires</a:t>
+            </a:r>
+          </a:p>
+          <a:p>
+            <a:pPr marL="285750" indent="-285750">
+              <a:buFontTx/>
+              <a:buChar char="-"/>
+            </a:pPr>
+            <a:endParaRPr lang="fr-FR" dirty="0"/>
+          </a:p>
+          <a:p>
+            <a:pPr marL="285750" indent="-285750">
+              <a:buFontTx/>
+              <a:buChar char="-"/>
+            </a:pPr>
+            <a:endParaRPr lang="fr-FR" dirty="0" smtClean="0"/>
+          </a:p>
+          <a:p>
+            <a:pPr marL="285750" indent="-285750">
+              <a:buFontTx/>
+              <a:buChar char="-"/>
+            </a:pPr>
+            <a:endParaRPr lang="fr-FR" dirty="0" smtClean="0"/>
+          </a:p>
+        </p:txBody>
+      </p:sp>
+    </p:spTree>
+    <p:extLst>
+      <p:ext uri="{BB962C8B-B14F-4D97-AF65-F5344CB8AC3E}">
+        <p14:creationId xmlns:p14="http://schemas.microsoft.com/office/powerpoint/2010/main" val="3280440723"/>
+      </p:ext>
+    </p:extLst>
+  </p:cSld>
+  <p:clrMapOvr>
+    <a:masterClrMapping/>
+  </p:clrMapOvr>
+</p:sld>
+</file>
+
+<file path=ppt/slides/slide4.xml><?xml version="1.0" encoding="utf-8"?>
+<p:sld xmlns:a="http://schemas.openxmlformats.org/drawingml/2006/main" xmlns:r="http://schemas.openxmlformats.org/officeDocument/2006/relationships" xmlns:p="http://schemas.openxmlformats.org/presentationml/2006/main">
+  <p:cSld>
+    <p:spTree>
+      <p:nvGrpSpPr>
+        <p:cNvPr id="1" name=""/>
+        <p:cNvGrpSpPr/>
+        <p:nvPr/>
+      </p:nvGrpSpPr>
+      <p:grpSpPr>
+        <a:xfrm>
+          <a:off x="0" y="0"/>
+          <a:ext cx="0" cy="0"/>
+          <a:chOff x="0" y="0"/>
+          <a:chExt cx="0" cy="0"/>
+        </a:xfrm>
+      </p:grpSpPr>
+      <p:sp>
+        <p:nvSpPr>
+          <p:cNvPr id="2" name="Titre 1"/>
+          <p:cNvSpPr>
+            <a:spLocks noGrp="1"/>
+          </p:cNvSpPr>
+          <p:nvPr>
+            <p:ph type="title"/>
+          </p:nvPr>
+        </p:nvSpPr>
+        <p:spPr/>
+        <p:txBody>
+          <a:bodyPr/>
+          <a:lstStyle/>
+          <a:p>
+            <a:endParaRPr lang="fr-FR"/>
+          </a:p>
+        </p:txBody>
+      </p:sp>
+    </p:spTree>
+    <p:extLst>
+      <p:ext uri="{BB962C8B-B14F-4D97-AF65-F5344CB8AC3E}">
+        <p14:creationId xmlns:p14="http://schemas.microsoft.com/office/powerpoint/2010/main" val="614604191"/>
+      </p:ext>
+    </p:extLst>
+  </p:cSld>
+  <p:clrMapOvr>
+    <a:masterClrMapping/>
+  </p:clrMapOvr>
+</p:sld>
+</file>
+
+<file path=ppt/slides/slide5.xml><?xml version="1.0" encoding="utf-8"?>
+<p:sld xmlns:a="http://schemas.openxmlformats.org/drawingml/2006/main" xmlns:r="http://schemas.openxmlformats.org/officeDocument/2006/relationships" xmlns:p="http://schemas.openxmlformats.org/presentationml/2006/main">
+  <p:cSld>
+    <p:spTree>
+      <p:nvGrpSpPr>
+        <p:cNvPr id="1" name=""/>
+        <p:cNvGrpSpPr/>
+        <p:nvPr/>
+      </p:nvGrpSpPr>
+      <p:grpSpPr>
+        <a:xfrm>
+          <a:off x="0" y="0"/>
+          <a:ext cx="0" cy="0"/>
+          <a:chOff x="0" y="0"/>
+          <a:chExt cx="0" cy="0"/>
+        </a:xfrm>
+      </p:grpSpPr>
+      <p:sp>
+        <p:nvSpPr>
+          <p:cNvPr id="2" name="Titre 1"/>
+          <p:cNvSpPr>
+            <a:spLocks noGrp="1"/>
+          </p:cNvSpPr>
+          <p:nvPr>
+            <p:ph type="title"/>
+          </p:nvPr>
+        </p:nvSpPr>
+        <p:spPr/>
+        <p:txBody>
+          <a:bodyPr/>
+          <a:lstStyle/>
+          <a:p>
+            <a:r>
+              <a:rPr lang="fr-FR" dirty="0" smtClean="0"/>
+              <a:t>Nettoyage des données</a:t>
+            </a:r>
+            <a:endParaRPr lang="fr-FR" dirty="0"/>
+          </a:p>
+        </p:txBody>
+      </p:sp>
+    </p:spTree>
+    <p:extLst>
+      <p:ext uri="{BB962C8B-B14F-4D97-AF65-F5344CB8AC3E}">
+        <p14:creationId xmlns:p14="http://schemas.microsoft.com/office/powerpoint/2010/main" val="1021893233"/>
+      </p:ext>
+    </p:extLst>
+  </p:cSld>
+  <p:clrMapOvr>
+    <a:masterClrMapping/>
+  </p:clrMapOvr>
+</p:sld>
+</file>
+
+<file path=ppt/slides/slide6.xml><?xml version="1.0" encoding="utf-8"?>
+<p:sld xmlns:a="http://schemas.openxmlformats.org/drawingml/2006/main" xmlns:r="http://schemas.openxmlformats.org/officeDocument/2006/relationships" xmlns:p="http://schemas.openxmlformats.org/presentationml/2006/main">
+  <p:cSld>
+    <p:spTree>
+      <p:nvGrpSpPr>
+        <p:cNvPr id="1" name=""/>
+        <p:cNvGrpSpPr/>
+        <p:nvPr/>
+      </p:nvGrpSpPr>
+      <p:grpSpPr>
+        <a:xfrm>
+          <a:off x="0" y="0"/>
+          <a:ext cx="0" cy="0"/>
+          <a:chOff x="0" y="0"/>
+          <a:chExt cx="0" cy="0"/>
+        </a:xfrm>
+      </p:grpSpPr>
+      <p:sp>
+        <p:nvSpPr>
+          <p:cNvPr id="2" name="Titre 1"/>
+          <p:cNvSpPr>
+            <a:spLocks noGrp="1"/>
+          </p:cNvSpPr>
+          <p:nvPr>
+            <p:ph type="title"/>
+          </p:nvPr>
+        </p:nvSpPr>
+        <p:spPr/>
+        <p:txBody>
+          <a:bodyPr/>
+          <a:lstStyle/>
+          <a:p>
+            <a:r>
+              <a:rPr lang="fr-FR" dirty="0"/>
+              <a:t>Nettoyage des données</a:t>
+            </a:r>
           </a:p>
         </p:txBody>
       </p:sp>
@@ -4072,6 +5005,229 @@
 </p:sld>
 </file>
 
+<file path=ppt/slides/slide7.xml><?xml version="1.0" encoding="utf-8"?>
+<p:sld xmlns:a="http://schemas.openxmlformats.org/drawingml/2006/main" xmlns:r="http://schemas.openxmlformats.org/officeDocument/2006/relationships" xmlns:p="http://schemas.openxmlformats.org/presentationml/2006/main">
+  <p:cSld>
+    <p:spTree>
+      <p:nvGrpSpPr>
+        <p:cNvPr id="1" name=""/>
+        <p:cNvGrpSpPr/>
+        <p:nvPr/>
+      </p:nvGrpSpPr>
+      <p:grpSpPr>
+        <a:xfrm>
+          <a:off x="0" y="0"/>
+          <a:ext cx="0" cy="0"/>
+          <a:chOff x="0" y="0"/>
+          <a:chExt cx="0" cy="0"/>
+        </a:xfrm>
+      </p:grpSpPr>
+      <p:sp>
+        <p:nvSpPr>
+          <p:cNvPr id="2" name="Titre 1"/>
+          <p:cNvSpPr>
+            <a:spLocks noGrp="1"/>
+          </p:cNvSpPr>
+          <p:nvPr>
+            <p:ph type="title"/>
+          </p:nvPr>
+        </p:nvSpPr>
+        <p:spPr/>
+        <p:txBody>
+          <a:bodyPr/>
+          <a:lstStyle/>
+          <a:p>
+            <a:r>
+              <a:rPr lang="fr-FR" dirty="0" smtClean="0"/>
+              <a:t>Analyse des données</a:t>
+            </a:r>
+            <a:endParaRPr lang="fr-FR" dirty="0"/>
+          </a:p>
+        </p:txBody>
+      </p:sp>
+      <p:sp>
+        <p:nvSpPr>
+          <p:cNvPr id="3" name="Rectangle 2"/>
+          <p:cNvSpPr/>
+          <p:nvPr/>
+        </p:nvSpPr>
+        <p:spPr>
+          <a:xfrm>
+            <a:off x="2267744" y="2636912"/>
+            <a:ext cx="914400" cy="914400"/>
+          </a:xfrm>
+          <a:prstGeom prst="rect">
+            <a:avLst/>
+          </a:prstGeom>
+          <a:noFill/>
+          <a:ln>
+            <a:noFill/>
+          </a:ln>
+        </p:spPr>
+        <p:style>
+          <a:lnRef idx="2">
+            <a:schemeClr val="accent1">
+              <a:shade val="50000"/>
+            </a:schemeClr>
+          </a:lnRef>
+          <a:fillRef idx="1">
+            <a:schemeClr val="accent1"/>
+          </a:fillRef>
+          <a:effectRef idx="0">
+            <a:schemeClr val="accent1"/>
+          </a:effectRef>
+          <a:fontRef idx="minor">
+            <a:schemeClr val="lt1"/>
+          </a:fontRef>
+        </p:style>
+        <p:txBody>
+          <a:bodyPr rtlCol="0" anchor="ctr"/>
+          <a:lstStyle/>
+          <a:p>
+            <a:pPr algn="ctr"/>
+            <a:endParaRPr lang="fr-FR"/>
+          </a:p>
+        </p:txBody>
+      </p:sp>
+    </p:spTree>
+    <p:extLst>
+      <p:ext uri="{BB962C8B-B14F-4D97-AF65-F5344CB8AC3E}">
+        <p14:creationId xmlns:p14="http://schemas.microsoft.com/office/powerpoint/2010/main" val="1514291475"/>
+      </p:ext>
+    </p:extLst>
+  </p:cSld>
+  <p:clrMapOvr>
+    <a:masterClrMapping/>
+  </p:clrMapOvr>
+</p:sld>
+</file>
+
+<file path=ppt/slides/slide8.xml><?xml version="1.0" encoding="utf-8"?>
+<p:sld xmlns:a="http://schemas.openxmlformats.org/drawingml/2006/main" xmlns:r="http://schemas.openxmlformats.org/officeDocument/2006/relationships" xmlns:p="http://schemas.openxmlformats.org/presentationml/2006/main">
+  <p:cSld>
+    <p:spTree>
+      <p:nvGrpSpPr>
+        <p:cNvPr id="1" name=""/>
+        <p:cNvGrpSpPr/>
+        <p:nvPr/>
+      </p:nvGrpSpPr>
+      <p:grpSpPr>
+        <a:xfrm>
+          <a:off x="0" y="0"/>
+          <a:ext cx="0" cy="0"/>
+          <a:chOff x="0" y="0"/>
+          <a:chExt cx="0" cy="0"/>
+        </a:xfrm>
+      </p:grpSpPr>
+      <p:sp>
+        <p:nvSpPr>
+          <p:cNvPr id="2" name="Titre 1"/>
+          <p:cNvSpPr>
+            <a:spLocks noGrp="1"/>
+          </p:cNvSpPr>
+          <p:nvPr>
+            <p:ph type="title"/>
+          </p:nvPr>
+        </p:nvSpPr>
+        <p:spPr/>
+        <p:txBody>
+          <a:bodyPr/>
+          <a:lstStyle/>
+          <a:p>
+            <a:r>
+              <a:rPr lang="fr-FR" dirty="0"/>
+              <a:t>Analyse des données</a:t>
+            </a:r>
+          </a:p>
+        </p:txBody>
+      </p:sp>
+      <p:sp>
+        <p:nvSpPr>
+          <p:cNvPr id="3" name="Espace réservé du contenu 2"/>
+          <p:cNvSpPr>
+            <a:spLocks noGrp="1"/>
+          </p:cNvSpPr>
+          <p:nvPr>
+            <p:ph idx="1"/>
+          </p:nvPr>
+        </p:nvSpPr>
+        <p:spPr/>
+        <p:txBody>
+          <a:bodyPr/>
+          <a:lstStyle/>
+          <a:p>
+            <a:r>
+              <a:rPr lang="fr-FR" smtClean="0"/>
+              <a:t>Catégories</a:t>
+            </a:r>
+          </a:p>
+          <a:p>
+            <a:endParaRPr lang="fr-FR" dirty="0"/>
+          </a:p>
+        </p:txBody>
+      </p:sp>
+    </p:spTree>
+    <p:extLst>
+      <p:ext uri="{BB962C8B-B14F-4D97-AF65-F5344CB8AC3E}">
+        <p14:creationId xmlns:p14="http://schemas.microsoft.com/office/powerpoint/2010/main" val="3823284498"/>
+      </p:ext>
+    </p:extLst>
+  </p:cSld>
+  <p:clrMapOvr>
+    <a:masterClrMapping/>
+  </p:clrMapOvr>
+</p:sld>
+</file>
+
+<file path=ppt/slides/slide9.xml><?xml version="1.0" encoding="utf-8"?>
+<p:sld xmlns:a="http://schemas.openxmlformats.org/drawingml/2006/main" xmlns:r="http://schemas.openxmlformats.org/officeDocument/2006/relationships" xmlns:p="http://schemas.openxmlformats.org/presentationml/2006/main">
+  <p:cSld>
+    <p:spTree>
+      <p:nvGrpSpPr>
+        <p:cNvPr id="1" name=""/>
+        <p:cNvGrpSpPr/>
+        <p:nvPr/>
+      </p:nvGrpSpPr>
+      <p:grpSpPr>
+        <a:xfrm>
+          <a:off x="0" y="0"/>
+          <a:ext cx="0" cy="0"/>
+          <a:chOff x="0" y="0"/>
+          <a:chExt cx="0" cy="0"/>
+        </a:xfrm>
+      </p:grpSpPr>
+      <p:sp>
+        <p:nvSpPr>
+          <p:cNvPr id="2" name="Titre 1"/>
+          <p:cNvSpPr>
+            <a:spLocks noGrp="1"/>
+          </p:cNvSpPr>
+          <p:nvPr>
+            <p:ph type="title"/>
+          </p:nvPr>
+        </p:nvSpPr>
+        <p:spPr/>
+        <p:txBody>
+          <a:bodyPr/>
+          <a:lstStyle/>
+          <a:p>
+            <a:endParaRPr lang="fr-FR"/>
+          </a:p>
+        </p:txBody>
+      </p:sp>
+    </p:spTree>
+    <p:extLst>
+      <p:ext uri="{BB962C8B-B14F-4D97-AF65-F5344CB8AC3E}">
+        <p14:creationId xmlns:p14="http://schemas.microsoft.com/office/powerpoint/2010/main" val="1019117085"/>
+      </p:ext>
+    </p:extLst>
+  </p:cSld>
+  <p:clrMapOvr>
+    <a:masterClrMapping/>
+  </p:clrMapOvr>
+</p:sld>
+</file>
+
 <file path=ppt/theme/theme1.xml><?xml version="1.0" encoding="utf-8"?>
 <a:theme xmlns:a="http://schemas.openxmlformats.org/drawingml/2006/main" name="Thème Office">
   <a:themeElements>

</xml_diff>